<commit_message>
Update : add virtual party details; regenerate  with mint background; add
</commit_message>
<xml_diff>
--- a/home2.pptx
+++ b/home2.pptx
@@ -66,7 +66,7 @@
     <p:sldId id="314" r:id="rId60"/>
     <p:sldId id="315" r:id="rId61"/>
   </p:sldIdLst>
-  <p:sldSz cx="9144000" cy="5143500" type="screen16x9"/>
+  <p:sldSz cx="9144000" cy="6858000" type="screen4x3"/>
   <p:notesSz cx="6858000" cy="9144000"/>
   <p:defaultTextStyle>
     <a:defPPr>
@@ -163,22 +163,6 @@
       </a:defRPr>
     </a:lvl9pPr>
   </p:defaultTextStyle>
-  <p:extLst>
-    <p:ext uri="{EFAFB233-063F-42B5-8137-9DF3F51BA10A}">
-      <p15:sldGuideLst xmlns:p15="http://schemas.microsoft.com/office/powerpoint/2012/main">
-        <p15:guide id="1" orient="horz" pos="1620" userDrawn="1">
-          <p15:clr>
-            <a:srgbClr val="A4A3A4"/>
-          </p15:clr>
-        </p15:guide>
-        <p15:guide id="2" pos="2880" userDrawn="1">
-          <p15:clr>
-            <a:srgbClr val="A4A3A4"/>
-          </p15:clr>
-        </p15:guide>
-      </p15:sldGuideLst>
-    </p:ext>
-  </p:extLst>
 </p:presentation>
 </file>
 
@@ -211,8 +195,8 @@
         </p:nvSpPr>
         <p:spPr>
           <a:xfrm>
-            <a:off x="685800" y="1597819"/>
-            <a:ext cx="7772400" cy="1102519"/>
+            <a:off x="685800" y="2130425"/>
+            <a:ext cx="7772400" cy="1470025"/>
           </a:xfrm>
         </p:spPr>
         <p:txBody>
@@ -220,9 +204,10 @@
           <a:lstStyle/>
           <a:p>
             <a:r>
-              <a:rPr lang="en-US"/>
+              <a:rPr lang="en-US" smtClean="0"/>
               <a:t>Click to edit Master title style</a:t>
             </a:r>
+            <a:endParaRPr lang="en-US"/>
           </a:p>
         </p:txBody>
       </p:sp>
@@ -238,8 +223,8 @@
         </p:nvSpPr>
         <p:spPr>
           <a:xfrm>
-            <a:off x="1371600" y="2914650"/>
-            <a:ext cx="6400800" cy="1314450"/>
+            <a:off x="1371600" y="3886200"/>
+            <a:ext cx="6400800" cy="1752600"/>
           </a:xfrm>
         </p:spPr>
         <p:txBody>
@@ -255,7 +240,7 @@
                 </a:solidFill>
               </a:defRPr>
             </a:lvl1pPr>
-            <a:lvl2pPr marL="342900" indent="0" algn="ctr">
+            <a:lvl2pPr marL="457200" indent="0" algn="ctr">
               <a:buNone/>
               <a:defRPr>
                 <a:solidFill>
@@ -265,7 +250,7 @@
                 </a:solidFill>
               </a:defRPr>
             </a:lvl2pPr>
-            <a:lvl3pPr marL="685800" indent="0" algn="ctr">
+            <a:lvl3pPr marL="914400" indent="0" algn="ctr">
               <a:buNone/>
               <a:defRPr>
                 <a:solidFill>
@@ -275,7 +260,7 @@
                 </a:solidFill>
               </a:defRPr>
             </a:lvl3pPr>
-            <a:lvl4pPr marL="1028700" indent="0" algn="ctr">
+            <a:lvl4pPr marL="1371600" indent="0" algn="ctr">
               <a:buNone/>
               <a:defRPr>
                 <a:solidFill>
@@ -285,7 +270,7 @@
                 </a:solidFill>
               </a:defRPr>
             </a:lvl4pPr>
-            <a:lvl5pPr marL="1371600" indent="0" algn="ctr">
+            <a:lvl5pPr marL="1828800" indent="0" algn="ctr">
               <a:buNone/>
               <a:defRPr>
                 <a:solidFill>
@@ -295,7 +280,7 @@
                 </a:solidFill>
               </a:defRPr>
             </a:lvl5pPr>
-            <a:lvl6pPr marL="1714500" indent="0" algn="ctr">
+            <a:lvl6pPr marL="2286000" indent="0" algn="ctr">
               <a:buNone/>
               <a:defRPr>
                 <a:solidFill>
@@ -305,7 +290,7 @@
                 </a:solidFill>
               </a:defRPr>
             </a:lvl6pPr>
-            <a:lvl7pPr marL="2057400" indent="0" algn="ctr">
+            <a:lvl7pPr marL="2743200" indent="0" algn="ctr">
               <a:buNone/>
               <a:defRPr>
                 <a:solidFill>
@@ -315,7 +300,7 @@
                 </a:solidFill>
               </a:defRPr>
             </a:lvl7pPr>
-            <a:lvl8pPr marL="2400300" indent="0" algn="ctr">
+            <a:lvl8pPr marL="3200400" indent="0" algn="ctr">
               <a:buNone/>
               <a:defRPr>
                 <a:solidFill>
@@ -325,7 +310,7 @@
                 </a:solidFill>
               </a:defRPr>
             </a:lvl8pPr>
-            <a:lvl9pPr marL="2743200" indent="0" algn="ctr">
+            <a:lvl9pPr marL="3657600" indent="0" algn="ctr">
               <a:buNone/>
               <a:defRPr>
                 <a:solidFill>
@@ -338,9 +323,10 @@
           </a:lstStyle>
           <a:p>
             <a:r>
-              <a:rPr lang="en-US"/>
+              <a:rPr lang="en-US" smtClean="0"/>
               <a:t>Click to edit Master subtitle style</a:t>
             </a:r>
+            <a:endParaRPr lang="en-US"/>
           </a:p>
         </p:txBody>
       </p:sp>
@@ -359,9 +345,9 @@
           <a:bodyPr/>
           <a:lstStyle/>
           <a:p>
-            <a:fld id="{241EB5C9-1307-BA42-ABA2-0BC069CD8E7F}" type="datetimeFigureOut">
+            <a:fld id="{5BCAD085-E8A6-8845-BD4E-CB4CCA059FC4}" type="datetimeFigureOut">
               <a:rPr lang="en-US" smtClean="0"/>
-              <a:t>1/2/22</a:t>
+              <a:t>1/27/13</a:t>
             </a:fld>
             <a:endParaRPr lang="en-US"/>
           </a:p>
@@ -401,7 +387,7 @@
           <a:bodyPr/>
           <a:lstStyle/>
           <a:p>
-            <a:fld id="{C5EF2332-01BF-834F-8236-50238282D533}" type="slidenum">
+            <a:fld id="{C1FF6DA9-008F-8B48-92A6-B652298478BF}" type="slidenum">
               <a:rPr lang="en-US" smtClean="0"/>
               <a:t>‹#›</a:t>
             </a:fld>
@@ -412,7 +398,7 @@
     </p:spTree>
     <p:extLst>
       <p:ext uri="{BB962C8B-B14F-4D97-AF65-F5344CB8AC3E}">
-        <p14:creationId xmlns:p14="http://schemas.microsoft.com/office/powerpoint/2010/main" val="1444357513"/>
+        <p14:creationId xmlns:p14="http://schemas.microsoft.com/office/powerpoint/2010/main" val="3168075583"/>
       </p:ext>
     </p:extLst>
   </p:cSld>
@@ -455,9 +441,10 @@
           <a:lstStyle/>
           <a:p>
             <a:r>
-              <a:rPr lang="en-US"/>
+              <a:rPr lang="en-US" smtClean="0"/>
               <a:t>Click to edit Master title style</a:t>
             </a:r>
+            <a:endParaRPr lang="en-US"/>
           </a:p>
         </p:txBody>
       </p:sp>
@@ -478,37 +465,38 @@
           <a:p>
             <a:pPr lvl="0"/>
             <a:r>
-              <a:rPr lang="en-US"/>
+              <a:rPr lang="en-US" smtClean="0"/>
               <a:t>Click to edit Master text styles</a:t>
             </a:r>
           </a:p>
           <a:p>
             <a:pPr lvl="1"/>
             <a:r>
-              <a:rPr lang="en-US"/>
+              <a:rPr lang="en-US" smtClean="0"/>
               <a:t>Second level</a:t>
             </a:r>
           </a:p>
           <a:p>
             <a:pPr lvl="2"/>
             <a:r>
-              <a:rPr lang="en-US"/>
+              <a:rPr lang="en-US" smtClean="0"/>
               <a:t>Third level</a:t>
             </a:r>
           </a:p>
           <a:p>
             <a:pPr lvl="3"/>
             <a:r>
-              <a:rPr lang="en-US"/>
+              <a:rPr lang="en-US" smtClean="0"/>
               <a:t>Fourth level</a:t>
             </a:r>
           </a:p>
           <a:p>
             <a:pPr lvl="4"/>
             <a:r>
-              <a:rPr lang="en-US"/>
+              <a:rPr lang="en-US" smtClean="0"/>
               <a:t>Fifth level</a:t>
             </a:r>
+            <a:endParaRPr lang="en-US"/>
           </a:p>
         </p:txBody>
       </p:sp>
@@ -527,9 +515,9 @@
           <a:bodyPr/>
           <a:lstStyle/>
           <a:p>
-            <a:fld id="{241EB5C9-1307-BA42-ABA2-0BC069CD8E7F}" type="datetimeFigureOut">
+            <a:fld id="{5BCAD085-E8A6-8845-BD4E-CB4CCA059FC4}" type="datetimeFigureOut">
               <a:rPr lang="en-US" smtClean="0"/>
-              <a:t>1/2/22</a:t>
+              <a:t>1/27/13</a:t>
             </a:fld>
             <a:endParaRPr lang="en-US"/>
           </a:p>
@@ -569,7 +557,7 @@
           <a:bodyPr/>
           <a:lstStyle/>
           <a:p>
-            <a:fld id="{C5EF2332-01BF-834F-8236-50238282D533}" type="slidenum">
+            <a:fld id="{C1FF6DA9-008F-8B48-92A6-B652298478BF}" type="slidenum">
               <a:rPr lang="en-US" smtClean="0"/>
               <a:t>‹#›</a:t>
             </a:fld>
@@ -580,7 +568,7 @@
     </p:spTree>
     <p:extLst>
       <p:ext uri="{BB962C8B-B14F-4D97-AF65-F5344CB8AC3E}">
-        <p14:creationId xmlns:p14="http://schemas.microsoft.com/office/powerpoint/2010/main" val="313914798"/>
+        <p14:creationId xmlns:p14="http://schemas.microsoft.com/office/powerpoint/2010/main" val="2910927964"/>
       </p:ext>
     </p:extLst>
   </p:cSld>
@@ -619,8 +607,8 @@
         </p:nvSpPr>
         <p:spPr>
           <a:xfrm>
-            <a:off x="6629400" y="205979"/>
-            <a:ext cx="2057400" cy="4388644"/>
+            <a:off x="6629400" y="274638"/>
+            <a:ext cx="2057400" cy="5851525"/>
           </a:xfrm>
         </p:spPr>
         <p:txBody>
@@ -628,9 +616,10 @@
           <a:lstStyle/>
           <a:p>
             <a:r>
-              <a:rPr lang="en-US"/>
+              <a:rPr lang="en-US" smtClean="0"/>
               <a:t>Click to edit Master title style</a:t>
             </a:r>
+            <a:endParaRPr lang="en-US"/>
           </a:p>
         </p:txBody>
       </p:sp>
@@ -646,8 +635,8 @@
         </p:nvSpPr>
         <p:spPr>
           <a:xfrm>
-            <a:off x="457200" y="205979"/>
-            <a:ext cx="6019800" cy="4388644"/>
+            <a:off x="457200" y="274638"/>
+            <a:ext cx="6019800" cy="5851525"/>
           </a:xfrm>
         </p:spPr>
         <p:txBody>
@@ -656,37 +645,38 @@
           <a:p>
             <a:pPr lvl="0"/>
             <a:r>
-              <a:rPr lang="en-US"/>
+              <a:rPr lang="en-US" smtClean="0"/>
               <a:t>Click to edit Master text styles</a:t>
             </a:r>
           </a:p>
           <a:p>
             <a:pPr lvl="1"/>
             <a:r>
-              <a:rPr lang="en-US"/>
+              <a:rPr lang="en-US" smtClean="0"/>
               <a:t>Second level</a:t>
             </a:r>
           </a:p>
           <a:p>
             <a:pPr lvl="2"/>
             <a:r>
-              <a:rPr lang="en-US"/>
+              <a:rPr lang="en-US" smtClean="0"/>
               <a:t>Third level</a:t>
             </a:r>
           </a:p>
           <a:p>
             <a:pPr lvl="3"/>
             <a:r>
-              <a:rPr lang="en-US"/>
+              <a:rPr lang="en-US" smtClean="0"/>
               <a:t>Fourth level</a:t>
             </a:r>
           </a:p>
           <a:p>
             <a:pPr lvl="4"/>
             <a:r>
-              <a:rPr lang="en-US"/>
+              <a:rPr lang="en-US" smtClean="0"/>
               <a:t>Fifth level</a:t>
             </a:r>
+            <a:endParaRPr lang="en-US"/>
           </a:p>
         </p:txBody>
       </p:sp>
@@ -705,9 +695,9 @@
           <a:bodyPr/>
           <a:lstStyle/>
           <a:p>
-            <a:fld id="{241EB5C9-1307-BA42-ABA2-0BC069CD8E7F}" type="datetimeFigureOut">
+            <a:fld id="{5BCAD085-E8A6-8845-BD4E-CB4CCA059FC4}" type="datetimeFigureOut">
               <a:rPr lang="en-US" smtClean="0"/>
-              <a:t>1/2/22</a:t>
+              <a:t>1/27/13</a:t>
             </a:fld>
             <a:endParaRPr lang="en-US"/>
           </a:p>
@@ -747,7 +737,7 @@
           <a:bodyPr/>
           <a:lstStyle/>
           <a:p>
-            <a:fld id="{C5EF2332-01BF-834F-8236-50238282D533}" type="slidenum">
+            <a:fld id="{C1FF6DA9-008F-8B48-92A6-B652298478BF}" type="slidenum">
               <a:rPr lang="en-US" smtClean="0"/>
               <a:t>‹#›</a:t>
             </a:fld>
@@ -758,7 +748,7 @@
     </p:spTree>
     <p:extLst>
       <p:ext uri="{BB962C8B-B14F-4D97-AF65-F5344CB8AC3E}">
-        <p14:creationId xmlns:p14="http://schemas.microsoft.com/office/powerpoint/2010/main" val="2581529045"/>
+        <p14:creationId xmlns:p14="http://schemas.microsoft.com/office/powerpoint/2010/main" val="3612223792"/>
       </p:ext>
     </p:extLst>
   </p:cSld>
@@ -801,9 +791,10 @@
           <a:lstStyle/>
           <a:p>
             <a:r>
-              <a:rPr lang="en-US"/>
+              <a:rPr lang="en-US" smtClean="0"/>
               <a:t>Click to edit Master title style</a:t>
             </a:r>
+            <a:endParaRPr lang="en-US"/>
           </a:p>
         </p:txBody>
       </p:sp>
@@ -824,37 +815,38 @@
           <a:p>
             <a:pPr lvl="0"/>
             <a:r>
-              <a:rPr lang="en-US"/>
+              <a:rPr lang="en-US" smtClean="0"/>
               <a:t>Click to edit Master text styles</a:t>
             </a:r>
           </a:p>
           <a:p>
             <a:pPr lvl="1"/>
             <a:r>
-              <a:rPr lang="en-US"/>
+              <a:rPr lang="en-US" smtClean="0"/>
               <a:t>Second level</a:t>
             </a:r>
           </a:p>
           <a:p>
             <a:pPr lvl="2"/>
             <a:r>
-              <a:rPr lang="en-US"/>
+              <a:rPr lang="en-US" smtClean="0"/>
               <a:t>Third level</a:t>
             </a:r>
           </a:p>
           <a:p>
             <a:pPr lvl="3"/>
             <a:r>
-              <a:rPr lang="en-US"/>
+              <a:rPr lang="en-US" smtClean="0"/>
               <a:t>Fourth level</a:t>
             </a:r>
           </a:p>
           <a:p>
             <a:pPr lvl="4"/>
             <a:r>
-              <a:rPr lang="en-US"/>
+              <a:rPr lang="en-US" smtClean="0"/>
               <a:t>Fifth level</a:t>
             </a:r>
+            <a:endParaRPr lang="en-US"/>
           </a:p>
         </p:txBody>
       </p:sp>
@@ -873,9 +865,9 @@
           <a:bodyPr/>
           <a:lstStyle/>
           <a:p>
-            <a:fld id="{241EB5C9-1307-BA42-ABA2-0BC069CD8E7F}" type="datetimeFigureOut">
+            <a:fld id="{5BCAD085-E8A6-8845-BD4E-CB4CCA059FC4}" type="datetimeFigureOut">
               <a:rPr lang="en-US" smtClean="0"/>
-              <a:t>1/2/22</a:t>
+              <a:t>1/27/13</a:t>
             </a:fld>
             <a:endParaRPr lang="en-US"/>
           </a:p>
@@ -915,7 +907,7 @@
           <a:bodyPr/>
           <a:lstStyle/>
           <a:p>
-            <a:fld id="{C5EF2332-01BF-834F-8236-50238282D533}" type="slidenum">
+            <a:fld id="{C1FF6DA9-008F-8B48-92A6-B652298478BF}" type="slidenum">
               <a:rPr lang="en-US" smtClean="0"/>
               <a:t>‹#›</a:t>
             </a:fld>
@@ -926,7 +918,7 @@
     </p:spTree>
     <p:extLst>
       <p:ext uri="{BB962C8B-B14F-4D97-AF65-F5344CB8AC3E}">
-        <p14:creationId xmlns:p14="http://schemas.microsoft.com/office/powerpoint/2010/main" val="338346009"/>
+        <p14:creationId xmlns:p14="http://schemas.microsoft.com/office/powerpoint/2010/main" val="2614314258"/>
       </p:ext>
     </p:extLst>
   </p:cSld>
@@ -965,22 +957,23 @@
         </p:nvSpPr>
         <p:spPr>
           <a:xfrm>
-            <a:off x="722313" y="3305176"/>
-            <a:ext cx="7772400" cy="1021556"/>
+            <a:off x="722313" y="4406900"/>
+            <a:ext cx="7772400" cy="1362075"/>
           </a:xfrm>
         </p:spPr>
         <p:txBody>
           <a:bodyPr anchor="t"/>
           <a:lstStyle>
             <a:lvl1pPr algn="l">
-              <a:defRPr sz="3000" b="1" cap="all"/>
+              <a:defRPr sz="4000" b="1" cap="all"/>
             </a:lvl1pPr>
           </a:lstStyle>
           <a:p>
             <a:r>
-              <a:rPr lang="en-US"/>
+              <a:rPr lang="en-US" smtClean="0"/>
               <a:t>Click to edit Master title style</a:t>
             </a:r>
+            <a:endParaRPr lang="en-US"/>
           </a:p>
         </p:txBody>
       </p:sp>
@@ -996,8 +989,8 @@
         </p:nvSpPr>
         <p:spPr>
           <a:xfrm>
-            <a:off x="722313" y="2180035"/>
-            <a:ext cx="7772400" cy="1125140"/>
+            <a:off x="722313" y="2906713"/>
+            <a:ext cx="7772400" cy="1500187"/>
           </a:xfrm>
         </p:spPr>
         <p:txBody>
@@ -1005,7 +998,7 @@
           <a:lstStyle>
             <a:lvl1pPr marL="0" indent="0">
               <a:buNone/>
-              <a:defRPr sz="1500">
+              <a:defRPr sz="2000">
                 <a:solidFill>
                   <a:schemeClr val="tx1">
                     <a:tint val="75000"/>
@@ -1013,9 +1006,9 @@
                 </a:solidFill>
               </a:defRPr>
             </a:lvl1pPr>
-            <a:lvl2pPr marL="342900" indent="0">
-              <a:buNone/>
-              <a:defRPr sz="1350">
+            <a:lvl2pPr marL="457200" indent="0">
+              <a:buNone/>
+              <a:defRPr sz="1800">
                 <a:solidFill>
                   <a:schemeClr val="tx1">
                     <a:tint val="75000"/>
@@ -1023,9 +1016,9 @@
                 </a:solidFill>
               </a:defRPr>
             </a:lvl2pPr>
-            <a:lvl3pPr marL="685800" indent="0">
-              <a:buNone/>
-              <a:defRPr sz="1200">
+            <a:lvl3pPr marL="914400" indent="0">
+              <a:buNone/>
+              <a:defRPr sz="1600">
                 <a:solidFill>
                   <a:schemeClr val="tx1">
                     <a:tint val="75000"/>
@@ -1033,9 +1026,9 @@
                 </a:solidFill>
               </a:defRPr>
             </a:lvl3pPr>
-            <a:lvl4pPr marL="1028700" indent="0">
-              <a:buNone/>
-              <a:defRPr sz="1050">
+            <a:lvl4pPr marL="1371600" indent="0">
+              <a:buNone/>
+              <a:defRPr sz="1400">
                 <a:solidFill>
                   <a:schemeClr val="tx1">
                     <a:tint val="75000"/>
@@ -1043,9 +1036,9 @@
                 </a:solidFill>
               </a:defRPr>
             </a:lvl4pPr>
-            <a:lvl5pPr marL="1371600" indent="0">
-              <a:buNone/>
-              <a:defRPr sz="1050">
+            <a:lvl5pPr marL="1828800" indent="0">
+              <a:buNone/>
+              <a:defRPr sz="1400">
                 <a:solidFill>
                   <a:schemeClr val="tx1">
                     <a:tint val="75000"/>
@@ -1053,9 +1046,9 @@
                 </a:solidFill>
               </a:defRPr>
             </a:lvl5pPr>
-            <a:lvl6pPr marL="1714500" indent="0">
-              <a:buNone/>
-              <a:defRPr sz="1050">
+            <a:lvl6pPr marL="2286000" indent="0">
+              <a:buNone/>
+              <a:defRPr sz="1400">
                 <a:solidFill>
                   <a:schemeClr val="tx1">
                     <a:tint val="75000"/>
@@ -1063,9 +1056,9 @@
                 </a:solidFill>
               </a:defRPr>
             </a:lvl6pPr>
-            <a:lvl7pPr marL="2057400" indent="0">
-              <a:buNone/>
-              <a:defRPr sz="1050">
+            <a:lvl7pPr marL="2743200" indent="0">
+              <a:buNone/>
+              <a:defRPr sz="1400">
                 <a:solidFill>
                   <a:schemeClr val="tx1">
                     <a:tint val="75000"/>
@@ -1073,9 +1066,9 @@
                 </a:solidFill>
               </a:defRPr>
             </a:lvl7pPr>
-            <a:lvl8pPr marL="2400300" indent="0">
-              <a:buNone/>
-              <a:defRPr sz="1050">
+            <a:lvl8pPr marL="3200400" indent="0">
+              <a:buNone/>
+              <a:defRPr sz="1400">
                 <a:solidFill>
                   <a:schemeClr val="tx1">
                     <a:tint val="75000"/>
@@ -1083,9 +1076,9 @@
                 </a:solidFill>
               </a:defRPr>
             </a:lvl8pPr>
-            <a:lvl9pPr marL="2743200" indent="0">
-              <a:buNone/>
-              <a:defRPr sz="1050">
+            <a:lvl9pPr marL="3657600" indent="0">
+              <a:buNone/>
+              <a:defRPr sz="1400">
                 <a:solidFill>
                   <a:schemeClr val="tx1">
                     <a:tint val="75000"/>
@@ -1097,7 +1090,7 @@
           <a:p>
             <a:pPr lvl="0"/>
             <a:r>
-              <a:rPr lang="en-US"/>
+              <a:rPr lang="en-US" smtClean="0"/>
               <a:t>Click to edit Master text styles</a:t>
             </a:r>
           </a:p>
@@ -1118,9 +1111,9 @@
           <a:bodyPr/>
           <a:lstStyle/>
           <a:p>
-            <a:fld id="{241EB5C9-1307-BA42-ABA2-0BC069CD8E7F}" type="datetimeFigureOut">
+            <a:fld id="{5BCAD085-E8A6-8845-BD4E-CB4CCA059FC4}" type="datetimeFigureOut">
               <a:rPr lang="en-US" smtClean="0"/>
-              <a:t>1/2/22</a:t>
+              <a:t>1/27/13</a:t>
             </a:fld>
             <a:endParaRPr lang="en-US"/>
           </a:p>
@@ -1160,7 +1153,7 @@
           <a:bodyPr/>
           <a:lstStyle/>
           <a:p>
-            <a:fld id="{C5EF2332-01BF-834F-8236-50238282D533}" type="slidenum">
+            <a:fld id="{C1FF6DA9-008F-8B48-92A6-B652298478BF}" type="slidenum">
               <a:rPr lang="en-US" smtClean="0"/>
               <a:t>‹#›</a:t>
             </a:fld>
@@ -1171,7 +1164,7 @@
     </p:spTree>
     <p:extLst>
       <p:ext uri="{BB962C8B-B14F-4D97-AF65-F5344CB8AC3E}">
-        <p14:creationId xmlns:p14="http://schemas.microsoft.com/office/powerpoint/2010/main" val="1073069076"/>
+        <p14:creationId xmlns:p14="http://schemas.microsoft.com/office/powerpoint/2010/main" val="960648375"/>
       </p:ext>
     </p:extLst>
   </p:cSld>
@@ -1214,9 +1207,10 @@
           <a:lstStyle/>
           <a:p>
             <a:r>
-              <a:rPr lang="en-US"/>
+              <a:rPr lang="en-US" smtClean="0"/>
               <a:t>Click to edit Master title style</a:t>
             </a:r>
+            <a:endParaRPr lang="en-US"/>
           </a:p>
         </p:txBody>
       </p:sp>
@@ -1232,75 +1226,76 @@
         </p:nvSpPr>
         <p:spPr>
           <a:xfrm>
-            <a:off x="457200" y="1200151"/>
-            <a:ext cx="4038600" cy="3394472"/>
+            <a:off x="457200" y="1600200"/>
+            <a:ext cx="4038600" cy="4525963"/>
           </a:xfrm>
         </p:spPr>
         <p:txBody>
           <a:bodyPr/>
           <a:lstStyle>
             <a:lvl1pPr>
-              <a:defRPr sz="2100"/>
+              <a:defRPr sz="2800"/>
             </a:lvl1pPr>
             <a:lvl2pPr>
-              <a:defRPr sz="1800"/>
+              <a:defRPr sz="2400"/>
             </a:lvl2pPr>
             <a:lvl3pPr>
-              <a:defRPr sz="1500"/>
+              <a:defRPr sz="2000"/>
             </a:lvl3pPr>
             <a:lvl4pPr>
-              <a:defRPr sz="1350"/>
+              <a:defRPr sz="1800"/>
             </a:lvl4pPr>
             <a:lvl5pPr>
-              <a:defRPr sz="1350"/>
+              <a:defRPr sz="1800"/>
             </a:lvl5pPr>
             <a:lvl6pPr>
-              <a:defRPr sz="1350"/>
+              <a:defRPr sz="1800"/>
             </a:lvl6pPr>
             <a:lvl7pPr>
-              <a:defRPr sz="1350"/>
+              <a:defRPr sz="1800"/>
             </a:lvl7pPr>
             <a:lvl8pPr>
-              <a:defRPr sz="1350"/>
+              <a:defRPr sz="1800"/>
             </a:lvl8pPr>
             <a:lvl9pPr>
-              <a:defRPr sz="1350"/>
+              <a:defRPr sz="1800"/>
             </a:lvl9pPr>
           </a:lstStyle>
           <a:p>
             <a:pPr lvl="0"/>
             <a:r>
-              <a:rPr lang="en-US"/>
+              <a:rPr lang="en-US" smtClean="0"/>
               <a:t>Click to edit Master text styles</a:t>
             </a:r>
           </a:p>
           <a:p>
             <a:pPr lvl="1"/>
             <a:r>
-              <a:rPr lang="en-US"/>
+              <a:rPr lang="en-US" smtClean="0"/>
               <a:t>Second level</a:t>
             </a:r>
           </a:p>
           <a:p>
             <a:pPr lvl="2"/>
             <a:r>
-              <a:rPr lang="en-US"/>
+              <a:rPr lang="en-US" smtClean="0"/>
               <a:t>Third level</a:t>
             </a:r>
           </a:p>
           <a:p>
             <a:pPr lvl="3"/>
             <a:r>
-              <a:rPr lang="en-US"/>
+              <a:rPr lang="en-US" smtClean="0"/>
               <a:t>Fourth level</a:t>
             </a:r>
           </a:p>
           <a:p>
             <a:pPr lvl="4"/>
             <a:r>
-              <a:rPr lang="en-US"/>
+              <a:rPr lang="en-US" smtClean="0"/>
               <a:t>Fifth level</a:t>
             </a:r>
+            <a:endParaRPr lang="en-US"/>
           </a:p>
         </p:txBody>
       </p:sp>
@@ -1316,75 +1311,76 @@
         </p:nvSpPr>
         <p:spPr>
           <a:xfrm>
-            <a:off x="4648200" y="1200151"/>
-            <a:ext cx="4038600" cy="3394472"/>
+            <a:off x="4648200" y="1600200"/>
+            <a:ext cx="4038600" cy="4525963"/>
           </a:xfrm>
         </p:spPr>
         <p:txBody>
           <a:bodyPr/>
           <a:lstStyle>
             <a:lvl1pPr>
-              <a:defRPr sz="2100"/>
+              <a:defRPr sz="2800"/>
             </a:lvl1pPr>
             <a:lvl2pPr>
-              <a:defRPr sz="1800"/>
+              <a:defRPr sz="2400"/>
             </a:lvl2pPr>
             <a:lvl3pPr>
-              <a:defRPr sz="1500"/>
+              <a:defRPr sz="2000"/>
             </a:lvl3pPr>
             <a:lvl4pPr>
-              <a:defRPr sz="1350"/>
+              <a:defRPr sz="1800"/>
             </a:lvl4pPr>
             <a:lvl5pPr>
-              <a:defRPr sz="1350"/>
+              <a:defRPr sz="1800"/>
             </a:lvl5pPr>
             <a:lvl6pPr>
-              <a:defRPr sz="1350"/>
+              <a:defRPr sz="1800"/>
             </a:lvl6pPr>
             <a:lvl7pPr>
-              <a:defRPr sz="1350"/>
+              <a:defRPr sz="1800"/>
             </a:lvl7pPr>
             <a:lvl8pPr>
-              <a:defRPr sz="1350"/>
+              <a:defRPr sz="1800"/>
             </a:lvl8pPr>
             <a:lvl9pPr>
-              <a:defRPr sz="1350"/>
+              <a:defRPr sz="1800"/>
             </a:lvl9pPr>
           </a:lstStyle>
           <a:p>
             <a:pPr lvl="0"/>
             <a:r>
-              <a:rPr lang="en-US"/>
+              <a:rPr lang="en-US" smtClean="0"/>
               <a:t>Click to edit Master text styles</a:t>
             </a:r>
           </a:p>
           <a:p>
             <a:pPr lvl="1"/>
             <a:r>
-              <a:rPr lang="en-US"/>
+              <a:rPr lang="en-US" smtClean="0"/>
               <a:t>Second level</a:t>
             </a:r>
           </a:p>
           <a:p>
             <a:pPr lvl="2"/>
             <a:r>
-              <a:rPr lang="en-US"/>
+              <a:rPr lang="en-US" smtClean="0"/>
               <a:t>Third level</a:t>
             </a:r>
           </a:p>
           <a:p>
             <a:pPr lvl="3"/>
             <a:r>
-              <a:rPr lang="en-US"/>
+              <a:rPr lang="en-US" smtClean="0"/>
               <a:t>Fourth level</a:t>
             </a:r>
           </a:p>
           <a:p>
             <a:pPr lvl="4"/>
             <a:r>
-              <a:rPr lang="en-US"/>
+              <a:rPr lang="en-US" smtClean="0"/>
               <a:t>Fifth level</a:t>
             </a:r>
+            <a:endParaRPr lang="en-US"/>
           </a:p>
         </p:txBody>
       </p:sp>
@@ -1403,9 +1399,9 @@
           <a:bodyPr/>
           <a:lstStyle/>
           <a:p>
-            <a:fld id="{241EB5C9-1307-BA42-ABA2-0BC069CD8E7F}" type="datetimeFigureOut">
+            <a:fld id="{5BCAD085-E8A6-8845-BD4E-CB4CCA059FC4}" type="datetimeFigureOut">
               <a:rPr lang="en-US" smtClean="0"/>
-              <a:t>1/2/22</a:t>
+              <a:t>1/27/13</a:t>
             </a:fld>
             <a:endParaRPr lang="en-US"/>
           </a:p>
@@ -1445,7 +1441,7 @@
           <a:bodyPr/>
           <a:lstStyle/>
           <a:p>
-            <a:fld id="{C5EF2332-01BF-834F-8236-50238282D533}" type="slidenum">
+            <a:fld id="{C1FF6DA9-008F-8B48-92A6-B652298478BF}" type="slidenum">
               <a:rPr lang="en-US" smtClean="0"/>
               <a:t>‹#›</a:t>
             </a:fld>
@@ -1456,7 +1452,7 @@
     </p:spTree>
     <p:extLst>
       <p:ext uri="{BB962C8B-B14F-4D97-AF65-F5344CB8AC3E}">
-        <p14:creationId xmlns:p14="http://schemas.microsoft.com/office/powerpoint/2010/main" val="2619886245"/>
+        <p14:creationId xmlns:p14="http://schemas.microsoft.com/office/powerpoint/2010/main" val="2782244947"/>
       </p:ext>
     </p:extLst>
   </p:cSld>
@@ -1503,9 +1499,10 @@
           </a:lstStyle>
           <a:p>
             <a:r>
-              <a:rPr lang="en-US"/>
+              <a:rPr lang="en-US" smtClean="0"/>
               <a:t>Click to edit Master title style</a:t>
             </a:r>
+            <a:endParaRPr lang="en-US"/>
           </a:p>
         </p:txBody>
       </p:sp>
@@ -1521,8 +1518,8 @@
         </p:nvSpPr>
         <p:spPr>
           <a:xfrm>
-            <a:off x="457200" y="1151335"/>
-            <a:ext cx="4040188" cy="479822"/>
+            <a:off x="457200" y="1535113"/>
+            <a:ext cx="4040188" cy="639762"/>
           </a:xfrm>
         </p:spPr>
         <p:txBody>
@@ -1530,45 +1527,45 @@
           <a:lstStyle>
             <a:lvl1pPr marL="0" indent="0">
               <a:buNone/>
+              <a:defRPr sz="2400" b="1"/>
+            </a:lvl1pPr>
+            <a:lvl2pPr marL="457200" indent="0">
+              <a:buNone/>
+              <a:defRPr sz="2000" b="1"/>
+            </a:lvl2pPr>
+            <a:lvl3pPr marL="914400" indent="0">
+              <a:buNone/>
               <a:defRPr sz="1800" b="1"/>
-            </a:lvl1pPr>
-            <a:lvl2pPr marL="342900" indent="0">
-              <a:buNone/>
-              <a:defRPr sz="1500" b="1"/>
-            </a:lvl2pPr>
-            <a:lvl3pPr marL="685800" indent="0">
-              <a:buNone/>
-              <a:defRPr sz="1350" b="1"/>
             </a:lvl3pPr>
-            <a:lvl4pPr marL="1028700" indent="0">
-              <a:buNone/>
-              <a:defRPr sz="1200" b="1"/>
+            <a:lvl4pPr marL="1371600" indent="0">
+              <a:buNone/>
+              <a:defRPr sz="1600" b="1"/>
             </a:lvl4pPr>
-            <a:lvl5pPr marL="1371600" indent="0">
-              <a:buNone/>
-              <a:defRPr sz="1200" b="1"/>
+            <a:lvl5pPr marL="1828800" indent="0">
+              <a:buNone/>
+              <a:defRPr sz="1600" b="1"/>
             </a:lvl5pPr>
-            <a:lvl6pPr marL="1714500" indent="0">
-              <a:buNone/>
-              <a:defRPr sz="1200" b="1"/>
+            <a:lvl6pPr marL="2286000" indent="0">
+              <a:buNone/>
+              <a:defRPr sz="1600" b="1"/>
             </a:lvl6pPr>
-            <a:lvl7pPr marL="2057400" indent="0">
-              <a:buNone/>
-              <a:defRPr sz="1200" b="1"/>
+            <a:lvl7pPr marL="2743200" indent="0">
+              <a:buNone/>
+              <a:defRPr sz="1600" b="1"/>
             </a:lvl7pPr>
-            <a:lvl8pPr marL="2400300" indent="0">
-              <a:buNone/>
-              <a:defRPr sz="1200" b="1"/>
+            <a:lvl8pPr marL="3200400" indent="0">
+              <a:buNone/>
+              <a:defRPr sz="1600" b="1"/>
             </a:lvl8pPr>
-            <a:lvl9pPr marL="2743200" indent="0">
-              <a:buNone/>
-              <a:defRPr sz="1200" b="1"/>
+            <a:lvl9pPr marL="3657600" indent="0">
+              <a:buNone/>
+              <a:defRPr sz="1600" b="1"/>
             </a:lvl9pPr>
           </a:lstStyle>
           <a:p>
             <a:pPr lvl="0"/>
             <a:r>
-              <a:rPr lang="en-US"/>
+              <a:rPr lang="en-US" smtClean="0"/>
               <a:t>Click to edit Master text styles</a:t>
             </a:r>
           </a:p>
@@ -1586,75 +1583,76 @@
         </p:nvSpPr>
         <p:spPr>
           <a:xfrm>
-            <a:off x="457200" y="1631156"/>
-            <a:ext cx="4040188" cy="2963466"/>
+            <a:off x="457200" y="2174875"/>
+            <a:ext cx="4040188" cy="3951288"/>
           </a:xfrm>
         </p:spPr>
         <p:txBody>
           <a:bodyPr/>
           <a:lstStyle>
             <a:lvl1pPr>
-              <a:defRPr sz="1800"/>
+              <a:defRPr sz="2400"/>
             </a:lvl1pPr>
             <a:lvl2pPr>
-              <a:defRPr sz="1500"/>
+              <a:defRPr sz="2000"/>
             </a:lvl2pPr>
             <a:lvl3pPr>
-              <a:defRPr sz="1350"/>
+              <a:defRPr sz="1800"/>
             </a:lvl3pPr>
             <a:lvl4pPr>
-              <a:defRPr sz="1200"/>
+              <a:defRPr sz="1600"/>
             </a:lvl4pPr>
             <a:lvl5pPr>
-              <a:defRPr sz="1200"/>
+              <a:defRPr sz="1600"/>
             </a:lvl5pPr>
             <a:lvl6pPr>
-              <a:defRPr sz="1200"/>
+              <a:defRPr sz="1600"/>
             </a:lvl6pPr>
             <a:lvl7pPr>
-              <a:defRPr sz="1200"/>
+              <a:defRPr sz="1600"/>
             </a:lvl7pPr>
             <a:lvl8pPr>
-              <a:defRPr sz="1200"/>
+              <a:defRPr sz="1600"/>
             </a:lvl8pPr>
             <a:lvl9pPr>
-              <a:defRPr sz="1200"/>
+              <a:defRPr sz="1600"/>
             </a:lvl9pPr>
           </a:lstStyle>
           <a:p>
             <a:pPr lvl="0"/>
             <a:r>
-              <a:rPr lang="en-US"/>
+              <a:rPr lang="en-US" smtClean="0"/>
               <a:t>Click to edit Master text styles</a:t>
             </a:r>
           </a:p>
           <a:p>
             <a:pPr lvl="1"/>
             <a:r>
-              <a:rPr lang="en-US"/>
+              <a:rPr lang="en-US" smtClean="0"/>
               <a:t>Second level</a:t>
             </a:r>
           </a:p>
           <a:p>
             <a:pPr lvl="2"/>
             <a:r>
-              <a:rPr lang="en-US"/>
+              <a:rPr lang="en-US" smtClean="0"/>
               <a:t>Third level</a:t>
             </a:r>
           </a:p>
           <a:p>
             <a:pPr lvl="3"/>
             <a:r>
-              <a:rPr lang="en-US"/>
+              <a:rPr lang="en-US" smtClean="0"/>
               <a:t>Fourth level</a:t>
             </a:r>
           </a:p>
           <a:p>
             <a:pPr lvl="4"/>
             <a:r>
-              <a:rPr lang="en-US"/>
+              <a:rPr lang="en-US" smtClean="0"/>
               <a:t>Fifth level</a:t>
             </a:r>
+            <a:endParaRPr lang="en-US"/>
           </a:p>
         </p:txBody>
       </p:sp>
@@ -1670,8 +1668,8 @@
         </p:nvSpPr>
         <p:spPr>
           <a:xfrm>
-            <a:off x="4645026" y="1151335"/>
-            <a:ext cx="4041775" cy="479822"/>
+            <a:off x="4645025" y="1535113"/>
+            <a:ext cx="4041775" cy="639762"/>
           </a:xfrm>
         </p:spPr>
         <p:txBody>
@@ -1679,45 +1677,45 @@
           <a:lstStyle>
             <a:lvl1pPr marL="0" indent="0">
               <a:buNone/>
+              <a:defRPr sz="2400" b="1"/>
+            </a:lvl1pPr>
+            <a:lvl2pPr marL="457200" indent="0">
+              <a:buNone/>
+              <a:defRPr sz="2000" b="1"/>
+            </a:lvl2pPr>
+            <a:lvl3pPr marL="914400" indent="0">
+              <a:buNone/>
               <a:defRPr sz="1800" b="1"/>
-            </a:lvl1pPr>
-            <a:lvl2pPr marL="342900" indent="0">
-              <a:buNone/>
-              <a:defRPr sz="1500" b="1"/>
-            </a:lvl2pPr>
-            <a:lvl3pPr marL="685800" indent="0">
-              <a:buNone/>
-              <a:defRPr sz="1350" b="1"/>
             </a:lvl3pPr>
-            <a:lvl4pPr marL="1028700" indent="0">
-              <a:buNone/>
-              <a:defRPr sz="1200" b="1"/>
+            <a:lvl4pPr marL="1371600" indent="0">
+              <a:buNone/>
+              <a:defRPr sz="1600" b="1"/>
             </a:lvl4pPr>
-            <a:lvl5pPr marL="1371600" indent="0">
-              <a:buNone/>
-              <a:defRPr sz="1200" b="1"/>
+            <a:lvl5pPr marL="1828800" indent="0">
+              <a:buNone/>
+              <a:defRPr sz="1600" b="1"/>
             </a:lvl5pPr>
-            <a:lvl6pPr marL="1714500" indent="0">
-              <a:buNone/>
-              <a:defRPr sz="1200" b="1"/>
+            <a:lvl6pPr marL="2286000" indent="0">
+              <a:buNone/>
+              <a:defRPr sz="1600" b="1"/>
             </a:lvl6pPr>
-            <a:lvl7pPr marL="2057400" indent="0">
-              <a:buNone/>
-              <a:defRPr sz="1200" b="1"/>
+            <a:lvl7pPr marL="2743200" indent="0">
+              <a:buNone/>
+              <a:defRPr sz="1600" b="1"/>
             </a:lvl7pPr>
-            <a:lvl8pPr marL="2400300" indent="0">
-              <a:buNone/>
-              <a:defRPr sz="1200" b="1"/>
+            <a:lvl8pPr marL="3200400" indent="0">
+              <a:buNone/>
+              <a:defRPr sz="1600" b="1"/>
             </a:lvl8pPr>
-            <a:lvl9pPr marL="2743200" indent="0">
-              <a:buNone/>
-              <a:defRPr sz="1200" b="1"/>
+            <a:lvl9pPr marL="3657600" indent="0">
+              <a:buNone/>
+              <a:defRPr sz="1600" b="1"/>
             </a:lvl9pPr>
           </a:lstStyle>
           <a:p>
             <a:pPr lvl="0"/>
             <a:r>
-              <a:rPr lang="en-US"/>
+              <a:rPr lang="en-US" smtClean="0"/>
               <a:t>Click to edit Master text styles</a:t>
             </a:r>
           </a:p>
@@ -1735,75 +1733,76 @@
         </p:nvSpPr>
         <p:spPr>
           <a:xfrm>
-            <a:off x="4645026" y="1631156"/>
-            <a:ext cx="4041775" cy="2963466"/>
+            <a:off x="4645025" y="2174875"/>
+            <a:ext cx="4041775" cy="3951288"/>
           </a:xfrm>
         </p:spPr>
         <p:txBody>
           <a:bodyPr/>
           <a:lstStyle>
             <a:lvl1pPr>
-              <a:defRPr sz="1800"/>
+              <a:defRPr sz="2400"/>
             </a:lvl1pPr>
             <a:lvl2pPr>
-              <a:defRPr sz="1500"/>
+              <a:defRPr sz="2000"/>
             </a:lvl2pPr>
             <a:lvl3pPr>
-              <a:defRPr sz="1350"/>
+              <a:defRPr sz="1800"/>
             </a:lvl3pPr>
             <a:lvl4pPr>
-              <a:defRPr sz="1200"/>
+              <a:defRPr sz="1600"/>
             </a:lvl4pPr>
             <a:lvl5pPr>
-              <a:defRPr sz="1200"/>
+              <a:defRPr sz="1600"/>
             </a:lvl5pPr>
             <a:lvl6pPr>
-              <a:defRPr sz="1200"/>
+              <a:defRPr sz="1600"/>
             </a:lvl6pPr>
             <a:lvl7pPr>
-              <a:defRPr sz="1200"/>
+              <a:defRPr sz="1600"/>
             </a:lvl7pPr>
             <a:lvl8pPr>
-              <a:defRPr sz="1200"/>
+              <a:defRPr sz="1600"/>
             </a:lvl8pPr>
             <a:lvl9pPr>
-              <a:defRPr sz="1200"/>
+              <a:defRPr sz="1600"/>
             </a:lvl9pPr>
           </a:lstStyle>
           <a:p>
             <a:pPr lvl="0"/>
             <a:r>
-              <a:rPr lang="en-US"/>
+              <a:rPr lang="en-US" smtClean="0"/>
               <a:t>Click to edit Master text styles</a:t>
             </a:r>
           </a:p>
           <a:p>
             <a:pPr lvl="1"/>
             <a:r>
-              <a:rPr lang="en-US"/>
+              <a:rPr lang="en-US" smtClean="0"/>
               <a:t>Second level</a:t>
             </a:r>
           </a:p>
           <a:p>
             <a:pPr lvl="2"/>
             <a:r>
-              <a:rPr lang="en-US"/>
+              <a:rPr lang="en-US" smtClean="0"/>
               <a:t>Third level</a:t>
             </a:r>
           </a:p>
           <a:p>
             <a:pPr lvl="3"/>
             <a:r>
-              <a:rPr lang="en-US"/>
+              <a:rPr lang="en-US" smtClean="0"/>
               <a:t>Fourth level</a:t>
             </a:r>
           </a:p>
           <a:p>
             <a:pPr lvl="4"/>
             <a:r>
-              <a:rPr lang="en-US"/>
+              <a:rPr lang="en-US" smtClean="0"/>
               <a:t>Fifth level</a:t>
             </a:r>
+            <a:endParaRPr lang="en-US"/>
           </a:p>
         </p:txBody>
       </p:sp>
@@ -1822,9 +1821,9 @@
           <a:bodyPr/>
           <a:lstStyle/>
           <a:p>
-            <a:fld id="{241EB5C9-1307-BA42-ABA2-0BC069CD8E7F}" type="datetimeFigureOut">
+            <a:fld id="{5BCAD085-E8A6-8845-BD4E-CB4CCA059FC4}" type="datetimeFigureOut">
               <a:rPr lang="en-US" smtClean="0"/>
-              <a:t>1/2/22</a:t>
+              <a:t>1/27/13</a:t>
             </a:fld>
             <a:endParaRPr lang="en-US"/>
           </a:p>
@@ -1864,7 +1863,7 @@
           <a:bodyPr/>
           <a:lstStyle/>
           <a:p>
-            <a:fld id="{C5EF2332-01BF-834F-8236-50238282D533}" type="slidenum">
+            <a:fld id="{C1FF6DA9-008F-8B48-92A6-B652298478BF}" type="slidenum">
               <a:rPr lang="en-US" smtClean="0"/>
               <a:t>‹#›</a:t>
             </a:fld>
@@ -1875,7 +1874,7 @@
     </p:spTree>
     <p:extLst>
       <p:ext uri="{BB962C8B-B14F-4D97-AF65-F5344CB8AC3E}">
-        <p14:creationId xmlns:p14="http://schemas.microsoft.com/office/powerpoint/2010/main" val="2535793967"/>
+        <p14:creationId xmlns:p14="http://schemas.microsoft.com/office/powerpoint/2010/main" val="990158736"/>
       </p:ext>
     </p:extLst>
   </p:cSld>
@@ -1918,9 +1917,10 @@
           <a:lstStyle/>
           <a:p>
             <a:r>
-              <a:rPr lang="en-US"/>
+              <a:rPr lang="en-US" smtClean="0"/>
               <a:t>Click to edit Master title style</a:t>
             </a:r>
+            <a:endParaRPr lang="en-US"/>
           </a:p>
         </p:txBody>
       </p:sp>
@@ -1939,9 +1939,9 @@
           <a:bodyPr/>
           <a:lstStyle/>
           <a:p>
-            <a:fld id="{241EB5C9-1307-BA42-ABA2-0BC069CD8E7F}" type="datetimeFigureOut">
+            <a:fld id="{5BCAD085-E8A6-8845-BD4E-CB4CCA059FC4}" type="datetimeFigureOut">
               <a:rPr lang="en-US" smtClean="0"/>
-              <a:t>1/2/22</a:t>
+              <a:t>1/27/13</a:t>
             </a:fld>
             <a:endParaRPr lang="en-US"/>
           </a:p>
@@ -1981,7 +1981,7 @@
           <a:bodyPr/>
           <a:lstStyle/>
           <a:p>
-            <a:fld id="{C5EF2332-01BF-834F-8236-50238282D533}" type="slidenum">
+            <a:fld id="{C1FF6DA9-008F-8B48-92A6-B652298478BF}" type="slidenum">
               <a:rPr lang="en-US" smtClean="0"/>
               <a:t>‹#›</a:t>
             </a:fld>
@@ -1992,7 +1992,7 @@
     </p:spTree>
     <p:extLst>
       <p:ext uri="{BB962C8B-B14F-4D97-AF65-F5344CB8AC3E}">
-        <p14:creationId xmlns:p14="http://schemas.microsoft.com/office/powerpoint/2010/main" val="3472721253"/>
+        <p14:creationId xmlns:p14="http://schemas.microsoft.com/office/powerpoint/2010/main" val="727027711"/>
       </p:ext>
     </p:extLst>
   </p:cSld>
@@ -2034,9 +2034,9 @@
           <a:bodyPr/>
           <a:lstStyle/>
           <a:p>
-            <a:fld id="{241EB5C9-1307-BA42-ABA2-0BC069CD8E7F}" type="datetimeFigureOut">
+            <a:fld id="{5BCAD085-E8A6-8845-BD4E-CB4CCA059FC4}" type="datetimeFigureOut">
               <a:rPr lang="en-US" smtClean="0"/>
-              <a:t>1/2/22</a:t>
+              <a:t>1/27/13</a:t>
             </a:fld>
             <a:endParaRPr lang="en-US"/>
           </a:p>
@@ -2076,7 +2076,7 @@
           <a:bodyPr/>
           <a:lstStyle/>
           <a:p>
-            <a:fld id="{C5EF2332-01BF-834F-8236-50238282D533}" type="slidenum">
+            <a:fld id="{C1FF6DA9-008F-8B48-92A6-B652298478BF}" type="slidenum">
               <a:rPr lang="en-US" smtClean="0"/>
               <a:t>‹#›</a:t>
             </a:fld>
@@ -2087,7 +2087,7 @@
     </p:spTree>
     <p:extLst>
       <p:ext uri="{BB962C8B-B14F-4D97-AF65-F5344CB8AC3E}">
-        <p14:creationId xmlns:p14="http://schemas.microsoft.com/office/powerpoint/2010/main" val="2130901097"/>
+        <p14:creationId xmlns:p14="http://schemas.microsoft.com/office/powerpoint/2010/main" val="1212999818"/>
       </p:ext>
     </p:extLst>
   </p:cSld>
@@ -2126,22 +2126,23 @@
         </p:nvSpPr>
         <p:spPr>
           <a:xfrm>
-            <a:off x="457201" y="204787"/>
-            <a:ext cx="3008313" cy="871538"/>
+            <a:off x="457200" y="273050"/>
+            <a:ext cx="3008313" cy="1162050"/>
           </a:xfrm>
         </p:spPr>
         <p:txBody>
           <a:bodyPr anchor="b"/>
           <a:lstStyle>
             <a:lvl1pPr algn="l">
-              <a:defRPr sz="1500" b="1"/>
+              <a:defRPr sz="2000" b="1"/>
             </a:lvl1pPr>
           </a:lstStyle>
           <a:p>
             <a:r>
-              <a:rPr lang="en-US"/>
+              <a:rPr lang="en-US" smtClean="0"/>
               <a:t>Click to edit Master title style</a:t>
             </a:r>
+            <a:endParaRPr lang="en-US"/>
           </a:p>
         </p:txBody>
       </p:sp>
@@ -2157,75 +2158,76 @@
         </p:nvSpPr>
         <p:spPr>
           <a:xfrm>
-            <a:off x="3575050" y="204788"/>
-            <a:ext cx="5111750" cy="4389835"/>
+            <a:off x="3575050" y="273050"/>
+            <a:ext cx="5111750" cy="5853113"/>
           </a:xfrm>
         </p:spPr>
         <p:txBody>
           <a:bodyPr/>
           <a:lstStyle>
             <a:lvl1pPr>
-              <a:defRPr sz="2400"/>
+              <a:defRPr sz="3200"/>
             </a:lvl1pPr>
             <a:lvl2pPr>
-              <a:defRPr sz="2100"/>
+              <a:defRPr sz="2800"/>
             </a:lvl2pPr>
             <a:lvl3pPr>
-              <a:defRPr sz="1800"/>
+              <a:defRPr sz="2400"/>
             </a:lvl3pPr>
             <a:lvl4pPr>
-              <a:defRPr sz="1500"/>
+              <a:defRPr sz="2000"/>
             </a:lvl4pPr>
             <a:lvl5pPr>
-              <a:defRPr sz="1500"/>
+              <a:defRPr sz="2000"/>
             </a:lvl5pPr>
             <a:lvl6pPr>
-              <a:defRPr sz="1500"/>
+              <a:defRPr sz="2000"/>
             </a:lvl6pPr>
             <a:lvl7pPr>
-              <a:defRPr sz="1500"/>
+              <a:defRPr sz="2000"/>
             </a:lvl7pPr>
             <a:lvl8pPr>
-              <a:defRPr sz="1500"/>
+              <a:defRPr sz="2000"/>
             </a:lvl8pPr>
             <a:lvl9pPr>
-              <a:defRPr sz="1500"/>
+              <a:defRPr sz="2000"/>
             </a:lvl9pPr>
           </a:lstStyle>
           <a:p>
             <a:pPr lvl="0"/>
             <a:r>
-              <a:rPr lang="en-US"/>
+              <a:rPr lang="en-US" smtClean="0"/>
               <a:t>Click to edit Master text styles</a:t>
             </a:r>
           </a:p>
           <a:p>
             <a:pPr lvl="1"/>
             <a:r>
-              <a:rPr lang="en-US"/>
+              <a:rPr lang="en-US" smtClean="0"/>
               <a:t>Second level</a:t>
             </a:r>
           </a:p>
           <a:p>
             <a:pPr lvl="2"/>
             <a:r>
-              <a:rPr lang="en-US"/>
+              <a:rPr lang="en-US" smtClean="0"/>
               <a:t>Third level</a:t>
             </a:r>
           </a:p>
           <a:p>
             <a:pPr lvl="3"/>
             <a:r>
-              <a:rPr lang="en-US"/>
+              <a:rPr lang="en-US" smtClean="0"/>
               <a:t>Fourth level</a:t>
             </a:r>
           </a:p>
           <a:p>
             <a:pPr lvl="4"/>
             <a:r>
-              <a:rPr lang="en-US"/>
+              <a:rPr lang="en-US" smtClean="0"/>
               <a:t>Fifth level</a:t>
             </a:r>
+            <a:endParaRPr lang="en-US"/>
           </a:p>
         </p:txBody>
       </p:sp>
@@ -2241,8 +2243,8 @@
         </p:nvSpPr>
         <p:spPr>
           <a:xfrm>
-            <a:off x="457201" y="1076326"/>
-            <a:ext cx="3008313" cy="3518297"/>
+            <a:off x="457200" y="1435100"/>
+            <a:ext cx="3008313" cy="4691063"/>
           </a:xfrm>
         </p:spPr>
         <p:txBody>
@@ -2250,45 +2252,45 @@
           <a:lstStyle>
             <a:lvl1pPr marL="0" indent="0">
               <a:buNone/>
-              <a:defRPr sz="1050"/>
+              <a:defRPr sz="1400"/>
             </a:lvl1pPr>
-            <a:lvl2pPr marL="342900" indent="0">
+            <a:lvl2pPr marL="457200" indent="0">
+              <a:buNone/>
+              <a:defRPr sz="1200"/>
+            </a:lvl2pPr>
+            <a:lvl3pPr marL="914400" indent="0">
+              <a:buNone/>
+              <a:defRPr sz="1000"/>
+            </a:lvl3pPr>
+            <a:lvl4pPr marL="1371600" indent="0">
               <a:buNone/>
               <a:defRPr sz="900"/>
-            </a:lvl2pPr>
-            <a:lvl3pPr marL="685800" indent="0">
-              <a:buNone/>
-              <a:defRPr sz="750"/>
-            </a:lvl3pPr>
-            <a:lvl4pPr marL="1028700" indent="0">
-              <a:buNone/>
-              <a:defRPr sz="675"/>
             </a:lvl4pPr>
-            <a:lvl5pPr marL="1371600" indent="0">
-              <a:buNone/>
-              <a:defRPr sz="675"/>
+            <a:lvl5pPr marL="1828800" indent="0">
+              <a:buNone/>
+              <a:defRPr sz="900"/>
             </a:lvl5pPr>
-            <a:lvl6pPr marL="1714500" indent="0">
-              <a:buNone/>
-              <a:defRPr sz="675"/>
+            <a:lvl6pPr marL="2286000" indent="0">
+              <a:buNone/>
+              <a:defRPr sz="900"/>
             </a:lvl6pPr>
-            <a:lvl7pPr marL="2057400" indent="0">
-              <a:buNone/>
-              <a:defRPr sz="675"/>
+            <a:lvl7pPr marL="2743200" indent="0">
+              <a:buNone/>
+              <a:defRPr sz="900"/>
             </a:lvl7pPr>
-            <a:lvl8pPr marL="2400300" indent="0">
-              <a:buNone/>
-              <a:defRPr sz="675"/>
+            <a:lvl8pPr marL="3200400" indent="0">
+              <a:buNone/>
+              <a:defRPr sz="900"/>
             </a:lvl8pPr>
-            <a:lvl9pPr marL="2743200" indent="0">
-              <a:buNone/>
-              <a:defRPr sz="675"/>
+            <a:lvl9pPr marL="3657600" indent="0">
+              <a:buNone/>
+              <a:defRPr sz="900"/>
             </a:lvl9pPr>
           </a:lstStyle>
           <a:p>
             <a:pPr lvl="0"/>
             <a:r>
-              <a:rPr lang="en-US"/>
+              <a:rPr lang="en-US" smtClean="0"/>
               <a:t>Click to edit Master text styles</a:t>
             </a:r>
           </a:p>
@@ -2309,9 +2311,9 @@
           <a:bodyPr/>
           <a:lstStyle/>
           <a:p>
-            <a:fld id="{241EB5C9-1307-BA42-ABA2-0BC069CD8E7F}" type="datetimeFigureOut">
+            <a:fld id="{5BCAD085-E8A6-8845-BD4E-CB4CCA059FC4}" type="datetimeFigureOut">
               <a:rPr lang="en-US" smtClean="0"/>
-              <a:t>1/2/22</a:t>
+              <a:t>1/27/13</a:t>
             </a:fld>
             <a:endParaRPr lang="en-US"/>
           </a:p>
@@ -2351,7 +2353,7 @@
           <a:bodyPr/>
           <a:lstStyle/>
           <a:p>
-            <a:fld id="{C5EF2332-01BF-834F-8236-50238282D533}" type="slidenum">
+            <a:fld id="{C1FF6DA9-008F-8B48-92A6-B652298478BF}" type="slidenum">
               <a:rPr lang="en-US" smtClean="0"/>
               <a:t>‹#›</a:t>
             </a:fld>
@@ -2362,7 +2364,7 @@
     </p:spTree>
     <p:extLst>
       <p:ext uri="{BB962C8B-B14F-4D97-AF65-F5344CB8AC3E}">
-        <p14:creationId xmlns:p14="http://schemas.microsoft.com/office/powerpoint/2010/main" val="3540895647"/>
+        <p14:creationId xmlns:p14="http://schemas.microsoft.com/office/powerpoint/2010/main" val="1840726560"/>
       </p:ext>
     </p:extLst>
   </p:cSld>
@@ -2401,22 +2403,23 @@
         </p:nvSpPr>
         <p:spPr>
           <a:xfrm>
-            <a:off x="1792288" y="3600450"/>
-            <a:ext cx="5486400" cy="425054"/>
+            <a:off x="1792288" y="4800600"/>
+            <a:ext cx="5486400" cy="566738"/>
           </a:xfrm>
         </p:spPr>
         <p:txBody>
           <a:bodyPr anchor="b"/>
           <a:lstStyle>
             <a:lvl1pPr algn="l">
-              <a:defRPr sz="1500" b="1"/>
+              <a:defRPr sz="2000" b="1"/>
             </a:lvl1pPr>
           </a:lstStyle>
           <a:p>
             <a:r>
-              <a:rPr lang="en-US"/>
+              <a:rPr lang="en-US" smtClean="0"/>
               <a:t>Click to edit Master title style</a:t>
             </a:r>
+            <a:endParaRPr lang="en-US"/>
           </a:p>
         </p:txBody>
       </p:sp>
@@ -2432,8 +2435,8 @@
         </p:nvSpPr>
         <p:spPr>
           <a:xfrm>
-            <a:off x="1792288" y="459581"/>
-            <a:ext cx="5486400" cy="3086100"/>
+            <a:off x="1792288" y="612775"/>
+            <a:ext cx="5486400" cy="4114800"/>
           </a:xfrm>
         </p:spPr>
         <p:txBody>
@@ -2441,39 +2444,39 @@
           <a:lstStyle>
             <a:lvl1pPr marL="0" indent="0">
               <a:buNone/>
+              <a:defRPr sz="3200"/>
+            </a:lvl1pPr>
+            <a:lvl2pPr marL="457200" indent="0">
+              <a:buNone/>
+              <a:defRPr sz="2800"/>
+            </a:lvl2pPr>
+            <a:lvl3pPr marL="914400" indent="0">
+              <a:buNone/>
               <a:defRPr sz="2400"/>
-            </a:lvl1pPr>
-            <a:lvl2pPr marL="342900" indent="0">
-              <a:buNone/>
-              <a:defRPr sz="2100"/>
-            </a:lvl2pPr>
-            <a:lvl3pPr marL="685800" indent="0">
-              <a:buNone/>
-              <a:defRPr sz="1800"/>
             </a:lvl3pPr>
-            <a:lvl4pPr marL="1028700" indent="0">
-              <a:buNone/>
-              <a:defRPr sz="1500"/>
+            <a:lvl4pPr marL="1371600" indent="0">
+              <a:buNone/>
+              <a:defRPr sz="2000"/>
             </a:lvl4pPr>
-            <a:lvl5pPr marL="1371600" indent="0">
-              <a:buNone/>
-              <a:defRPr sz="1500"/>
+            <a:lvl5pPr marL="1828800" indent="0">
+              <a:buNone/>
+              <a:defRPr sz="2000"/>
             </a:lvl5pPr>
-            <a:lvl6pPr marL="1714500" indent="0">
-              <a:buNone/>
-              <a:defRPr sz="1500"/>
+            <a:lvl6pPr marL="2286000" indent="0">
+              <a:buNone/>
+              <a:defRPr sz="2000"/>
             </a:lvl6pPr>
-            <a:lvl7pPr marL="2057400" indent="0">
-              <a:buNone/>
-              <a:defRPr sz="1500"/>
+            <a:lvl7pPr marL="2743200" indent="0">
+              <a:buNone/>
+              <a:defRPr sz="2000"/>
             </a:lvl7pPr>
-            <a:lvl8pPr marL="2400300" indent="0">
-              <a:buNone/>
-              <a:defRPr sz="1500"/>
+            <a:lvl8pPr marL="3200400" indent="0">
+              <a:buNone/>
+              <a:defRPr sz="2000"/>
             </a:lvl8pPr>
-            <a:lvl9pPr marL="2743200" indent="0">
-              <a:buNone/>
-              <a:defRPr sz="1500"/>
+            <a:lvl9pPr marL="3657600" indent="0">
+              <a:buNone/>
+              <a:defRPr sz="2000"/>
             </a:lvl9pPr>
           </a:lstStyle>
           <a:p>
@@ -2493,8 +2496,8 @@
         </p:nvSpPr>
         <p:spPr>
           <a:xfrm>
-            <a:off x="1792288" y="4025503"/>
-            <a:ext cx="5486400" cy="603647"/>
+            <a:off x="1792288" y="5367338"/>
+            <a:ext cx="5486400" cy="804862"/>
           </a:xfrm>
         </p:spPr>
         <p:txBody>
@@ -2502,45 +2505,45 @@
           <a:lstStyle>
             <a:lvl1pPr marL="0" indent="0">
               <a:buNone/>
-              <a:defRPr sz="1050"/>
+              <a:defRPr sz="1400"/>
             </a:lvl1pPr>
-            <a:lvl2pPr marL="342900" indent="0">
+            <a:lvl2pPr marL="457200" indent="0">
+              <a:buNone/>
+              <a:defRPr sz="1200"/>
+            </a:lvl2pPr>
+            <a:lvl3pPr marL="914400" indent="0">
+              <a:buNone/>
+              <a:defRPr sz="1000"/>
+            </a:lvl3pPr>
+            <a:lvl4pPr marL="1371600" indent="0">
               <a:buNone/>
               <a:defRPr sz="900"/>
-            </a:lvl2pPr>
-            <a:lvl3pPr marL="685800" indent="0">
-              <a:buNone/>
-              <a:defRPr sz="750"/>
-            </a:lvl3pPr>
-            <a:lvl4pPr marL="1028700" indent="0">
-              <a:buNone/>
-              <a:defRPr sz="675"/>
             </a:lvl4pPr>
-            <a:lvl5pPr marL="1371600" indent="0">
-              <a:buNone/>
-              <a:defRPr sz="675"/>
+            <a:lvl5pPr marL="1828800" indent="0">
+              <a:buNone/>
+              <a:defRPr sz="900"/>
             </a:lvl5pPr>
-            <a:lvl6pPr marL="1714500" indent="0">
-              <a:buNone/>
-              <a:defRPr sz="675"/>
+            <a:lvl6pPr marL="2286000" indent="0">
+              <a:buNone/>
+              <a:defRPr sz="900"/>
             </a:lvl6pPr>
-            <a:lvl7pPr marL="2057400" indent="0">
-              <a:buNone/>
-              <a:defRPr sz="675"/>
+            <a:lvl7pPr marL="2743200" indent="0">
+              <a:buNone/>
+              <a:defRPr sz="900"/>
             </a:lvl7pPr>
-            <a:lvl8pPr marL="2400300" indent="0">
-              <a:buNone/>
-              <a:defRPr sz="675"/>
+            <a:lvl8pPr marL="3200400" indent="0">
+              <a:buNone/>
+              <a:defRPr sz="900"/>
             </a:lvl8pPr>
-            <a:lvl9pPr marL="2743200" indent="0">
-              <a:buNone/>
-              <a:defRPr sz="675"/>
+            <a:lvl9pPr marL="3657600" indent="0">
+              <a:buNone/>
+              <a:defRPr sz="900"/>
             </a:lvl9pPr>
           </a:lstStyle>
           <a:p>
             <a:pPr lvl="0"/>
             <a:r>
-              <a:rPr lang="en-US"/>
+              <a:rPr lang="en-US" smtClean="0"/>
               <a:t>Click to edit Master text styles</a:t>
             </a:r>
           </a:p>
@@ -2561,9 +2564,9 @@
           <a:bodyPr/>
           <a:lstStyle/>
           <a:p>
-            <a:fld id="{241EB5C9-1307-BA42-ABA2-0BC069CD8E7F}" type="datetimeFigureOut">
+            <a:fld id="{5BCAD085-E8A6-8845-BD4E-CB4CCA059FC4}" type="datetimeFigureOut">
               <a:rPr lang="en-US" smtClean="0"/>
-              <a:t>1/2/22</a:t>
+              <a:t>1/27/13</a:t>
             </a:fld>
             <a:endParaRPr lang="en-US"/>
           </a:p>
@@ -2603,7 +2606,7 @@
           <a:bodyPr/>
           <a:lstStyle/>
           <a:p>
-            <a:fld id="{C5EF2332-01BF-834F-8236-50238282D533}" type="slidenum">
+            <a:fld id="{C1FF6DA9-008F-8B48-92A6-B652298478BF}" type="slidenum">
               <a:rPr lang="en-US" smtClean="0"/>
               <a:t>‹#›</a:t>
             </a:fld>
@@ -2614,7 +2617,7 @@
     </p:spTree>
     <p:extLst>
       <p:ext uri="{BB962C8B-B14F-4D97-AF65-F5344CB8AC3E}">
-        <p14:creationId xmlns:p14="http://schemas.microsoft.com/office/powerpoint/2010/main" val="3566899855"/>
+        <p14:creationId xmlns:p14="http://schemas.microsoft.com/office/powerpoint/2010/main" val="3889236939"/>
       </p:ext>
     </p:extLst>
   </p:cSld>
@@ -2658,8 +2661,8 @@
         </p:nvSpPr>
         <p:spPr>
           <a:xfrm>
-            <a:off x="457200" y="205979"/>
-            <a:ext cx="8229600" cy="857250"/>
+            <a:off x="457200" y="274638"/>
+            <a:ext cx="8229600" cy="1143000"/>
           </a:xfrm>
           <a:prstGeom prst="rect">
             <a:avLst/>
@@ -2672,9 +2675,10 @@
           <a:lstStyle/>
           <a:p>
             <a:r>
-              <a:rPr lang="en-US"/>
+              <a:rPr lang="en-US" smtClean="0"/>
               <a:t>Click to edit Master title style</a:t>
             </a:r>
+            <a:endParaRPr lang="en-US"/>
           </a:p>
         </p:txBody>
       </p:sp>
@@ -2690,8 +2694,8 @@
         </p:nvSpPr>
         <p:spPr>
           <a:xfrm>
-            <a:off x="457200" y="1200151"/>
-            <a:ext cx="8229600" cy="3394472"/>
+            <a:off x="457200" y="1600200"/>
+            <a:ext cx="8229600" cy="4525963"/>
           </a:xfrm>
           <a:prstGeom prst="rect">
             <a:avLst/>
@@ -2705,37 +2709,38 @@
           <a:p>
             <a:pPr lvl="0"/>
             <a:r>
-              <a:rPr lang="en-US"/>
+              <a:rPr lang="en-US" smtClean="0"/>
               <a:t>Click to edit Master text styles</a:t>
             </a:r>
           </a:p>
           <a:p>
             <a:pPr lvl="1"/>
             <a:r>
-              <a:rPr lang="en-US"/>
+              <a:rPr lang="en-US" smtClean="0"/>
               <a:t>Second level</a:t>
             </a:r>
           </a:p>
           <a:p>
             <a:pPr lvl="2"/>
             <a:r>
-              <a:rPr lang="en-US"/>
+              <a:rPr lang="en-US" smtClean="0"/>
               <a:t>Third level</a:t>
             </a:r>
           </a:p>
           <a:p>
             <a:pPr lvl="3"/>
             <a:r>
-              <a:rPr lang="en-US"/>
+              <a:rPr lang="en-US" smtClean="0"/>
               <a:t>Fourth level</a:t>
             </a:r>
           </a:p>
           <a:p>
             <a:pPr lvl="4"/>
             <a:r>
-              <a:rPr lang="en-US"/>
+              <a:rPr lang="en-US" smtClean="0"/>
               <a:t>Fifth level</a:t>
             </a:r>
+            <a:endParaRPr lang="en-US"/>
           </a:p>
         </p:txBody>
       </p:sp>
@@ -2751,8 +2756,8 @@
         </p:nvSpPr>
         <p:spPr>
           <a:xfrm>
-            <a:off x="457200" y="4767263"/>
-            <a:ext cx="2133600" cy="273844"/>
+            <a:off x="457200" y="6356350"/>
+            <a:ext cx="2133600" cy="365125"/>
           </a:xfrm>
           <a:prstGeom prst="rect">
             <a:avLst/>
@@ -2762,7 +2767,7 @@
           <a:bodyPr anchor="ctr" bIns="45720" lIns="91440" rIns="91440" rtlCol="0" tIns="45720" vert="horz"/>
           <a:lstStyle>
             <a:lvl1pPr algn="l">
-              <a:defRPr sz="900">
+              <a:defRPr sz="1200">
                 <a:solidFill>
                   <a:schemeClr val="tx1">
                     <a:tint val="75000"/>
@@ -2772,9 +2777,9 @@
             </a:lvl1pPr>
           </a:lstStyle>
           <a:p>
-            <a:fld id="{241EB5C9-1307-BA42-ABA2-0BC069CD8E7F}" type="datetimeFigureOut">
+            <a:fld id="{5BCAD085-E8A6-8845-BD4E-CB4CCA059FC4}" type="datetimeFigureOut">
               <a:rPr lang="en-US" smtClean="0"/>
-              <a:t>1/2/22</a:t>
+              <a:t>1/27/13</a:t>
             </a:fld>
             <a:endParaRPr lang="en-US"/>
           </a:p>
@@ -2792,8 +2797,8 @@
         </p:nvSpPr>
         <p:spPr>
           <a:xfrm>
-            <a:off x="3124200" y="4767263"/>
-            <a:ext cx="2895600" cy="273844"/>
+            <a:off x="3124200" y="6356350"/>
+            <a:ext cx="2895600" cy="365125"/>
           </a:xfrm>
           <a:prstGeom prst="rect">
             <a:avLst/>
@@ -2803,7 +2808,7 @@
           <a:bodyPr anchor="ctr" bIns="45720" lIns="91440" rIns="91440" rtlCol="0" tIns="45720" vert="horz"/>
           <a:lstStyle>
             <a:lvl1pPr algn="ctr">
-              <a:defRPr sz="900">
+              <a:defRPr sz="1200">
                 <a:solidFill>
                   <a:schemeClr val="tx1">
                     <a:tint val="75000"/>
@@ -2829,8 +2834,8 @@
         </p:nvSpPr>
         <p:spPr>
           <a:xfrm>
-            <a:off x="6553200" y="4767263"/>
-            <a:ext cx="2133600" cy="273844"/>
+            <a:off x="6553200" y="6356350"/>
+            <a:ext cx="2133600" cy="365125"/>
           </a:xfrm>
           <a:prstGeom prst="rect">
             <a:avLst/>
@@ -2840,7 +2845,7 @@
           <a:bodyPr anchor="ctr" bIns="45720" lIns="91440" rIns="91440" rtlCol="0" tIns="45720" vert="horz"/>
           <a:lstStyle>
             <a:lvl1pPr algn="r">
-              <a:defRPr sz="900">
+              <a:defRPr sz="1200">
                 <a:solidFill>
                   <a:schemeClr val="tx1">
                     <a:tint val="75000"/>
@@ -2850,7 +2855,7 @@
             </a:lvl1pPr>
           </a:lstStyle>
           <a:p>
-            <a:fld id="{C5EF2332-01BF-834F-8236-50238282D533}" type="slidenum">
+            <a:fld id="{C1FF6DA9-008F-8B48-92A6-B652298478BF}" type="slidenum">
               <a:rPr lang="en-US" smtClean="0"/>
               <a:t>‹#›</a:t>
             </a:fld>
@@ -2861,7 +2866,7 @@
     </p:spTree>
     <p:extLst>
       <p:ext uri="{BB962C8B-B14F-4D97-AF65-F5344CB8AC3E}">
-        <p14:creationId xmlns:p14="http://schemas.microsoft.com/office/powerpoint/2010/main" val="3676200875"/>
+        <p14:creationId xmlns:p14="http://schemas.microsoft.com/office/powerpoint/2010/main" val="2209977519"/>
       </p:ext>
     </p:extLst>
   </p:cSld>
@@ -2881,12 +2886,12 @@
   </p:sldLayoutIdLst>
   <p:txStyles>
     <p:titleStyle>
-      <a:lvl1pPr algn="ctr" defTabSz="342900" eaLnBrk="1" hangingPunct="1" latinLnBrk="0" rtl="0">
+      <a:lvl1pPr algn="ctr" defTabSz="457200" eaLnBrk="1" hangingPunct="1" latinLnBrk="0" rtl="0">
         <a:spcBef>
           <a:spcPct val="0"/>
         </a:spcBef>
         <a:buNone/>
-        <a:defRPr kern="1200" sz="3300">
+        <a:defRPr kern="1200" sz="4400">
           <a:solidFill>
             <a:schemeClr val="tx1"/>
           </a:solidFill>
@@ -2897,7 +2902,37 @@
       </a:lvl1pPr>
     </p:titleStyle>
     <p:bodyStyle>
-      <a:lvl1pPr algn="l" defTabSz="342900" eaLnBrk="1" hangingPunct="1" indent="-342900" latinLnBrk="0" marL="342900" rtl="0">
+      <a:lvl1pPr algn="l" defTabSz="457200" eaLnBrk="1" hangingPunct="1" indent="-342900" latinLnBrk="0" marL="342900" rtl="0">
+        <a:spcBef>
+          <a:spcPct val="20000"/>
+        </a:spcBef>
+        <a:buFont typeface="Arial"/>
+        <a:buChar char="•"/>
+        <a:defRPr kern="1200" sz="3200">
+          <a:solidFill>
+            <a:schemeClr val="tx1"/>
+          </a:solidFill>
+          <a:latin typeface="+mn-lt"/>
+          <a:ea typeface="+mn-ea"/>
+          <a:cs typeface="+mn-cs"/>
+        </a:defRPr>
+      </a:lvl1pPr>
+      <a:lvl2pPr algn="l" defTabSz="457200" eaLnBrk="1" hangingPunct="1" indent="-285750" latinLnBrk="0" marL="742950" rtl="0">
+        <a:spcBef>
+          <a:spcPct val="20000"/>
+        </a:spcBef>
+        <a:buFont typeface="Arial"/>
+        <a:buChar char="–"/>
+        <a:defRPr kern="1200" sz="2800">
+          <a:solidFill>
+            <a:schemeClr val="tx1"/>
+          </a:solidFill>
+          <a:latin typeface="+mn-lt"/>
+          <a:ea typeface="+mn-ea"/>
+          <a:cs typeface="+mn-cs"/>
+        </a:defRPr>
+      </a:lvl2pPr>
+      <a:lvl3pPr algn="l" defTabSz="457200" eaLnBrk="1" hangingPunct="1" indent="-228600" latinLnBrk="0" marL="1143000" rtl="0">
         <a:spcBef>
           <a:spcPct val="20000"/>
         </a:spcBef>
@@ -2911,44 +2946,14 @@
           <a:ea typeface="+mn-ea"/>
           <a:cs typeface="+mn-cs"/>
         </a:defRPr>
-      </a:lvl1pPr>
-      <a:lvl2pPr algn="l" defTabSz="342900" eaLnBrk="1" hangingPunct="1" indent="-342900" latinLnBrk="0" marL="685800" rtl="0">
+      </a:lvl3pPr>
+      <a:lvl4pPr algn="l" defTabSz="457200" eaLnBrk="1" hangingPunct="1" indent="-228600" latinLnBrk="0" marL="1600200" rtl="0">
         <a:spcBef>
           <a:spcPct val="20000"/>
         </a:spcBef>
         <a:buFont typeface="Arial"/>
         <a:buChar char="–"/>
-        <a:defRPr kern="1200" sz="2100">
-          <a:solidFill>
-            <a:schemeClr val="tx1"/>
-          </a:solidFill>
-          <a:latin typeface="+mn-lt"/>
-          <a:ea typeface="+mn-ea"/>
-          <a:cs typeface="+mn-cs"/>
-        </a:defRPr>
-      </a:lvl2pPr>
-      <a:lvl3pPr algn="l" defTabSz="342900" eaLnBrk="1" hangingPunct="1" indent="-342900" latinLnBrk="0" marL="1028700" rtl="0">
-        <a:spcBef>
-          <a:spcPct val="20000"/>
-        </a:spcBef>
-        <a:buFont typeface="Arial"/>
-        <a:buChar char="•"/>
-        <a:defRPr kern="1200" sz="1800">
-          <a:solidFill>
-            <a:schemeClr val="tx1"/>
-          </a:solidFill>
-          <a:latin typeface="+mn-lt"/>
-          <a:ea typeface="+mn-ea"/>
-          <a:cs typeface="+mn-cs"/>
-        </a:defRPr>
-      </a:lvl3pPr>
-      <a:lvl4pPr algn="l" defTabSz="342900" eaLnBrk="1" hangingPunct="1" indent="-342900" latinLnBrk="0" marL="1371600" rtl="0">
-        <a:spcBef>
-          <a:spcPct val="20000"/>
-        </a:spcBef>
-        <a:buFont typeface="Arial"/>
-        <a:buChar char="–"/>
-        <a:defRPr kern="1200" sz="1500">
+        <a:defRPr kern="1200" sz="2000">
           <a:solidFill>
             <a:schemeClr val="tx1"/>
           </a:solidFill>
@@ -2957,13 +2962,13 @@
           <a:cs typeface="+mn-cs"/>
         </a:defRPr>
       </a:lvl4pPr>
-      <a:lvl5pPr algn="l" defTabSz="342900" eaLnBrk="1" hangingPunct="1" indent="-342900" latinLnBrk="0" marL="1714500" rtl="0">
+      <a:lvl5pPr algn="l" defTabSz="457200" eaLnBrk="1" hangingPunct="1" indent="-228600" latinLnBrk="0" marL="2057400" rtl="0">
         <a:spcBef>
           <a:spcPct val="20000"/>
         </a:spcBef>
         <a:buFont typeface="Arial"/>
         <a:buChar char="»"/>
-        <a:defRPr kern="1200" sz="1500">
+        <a:defRPr kern="1200" sz="2000">
           <a:solidFill>
             <a:schemeClr val="tx1"/>
           </a:solidFill>
@@ -2972,13 +2977,13 @@
           <a:cs typeface="+mn-cs"/>
         </a:defRPr>
       </a:lvl5pPr>
-      <a:lvl6pPr algn="l" defTabSz="342900" eaLnBrk="1" hangingPunct="1" indent="-342900" latinLnBrk="0" marL="2057400" rtl="0">
+      <a:lvl6pPr algn="l" defTabSz="457200" eaLnBrk="1" hangingPunct="1" indent="-228600" latinLnBrk="0" marL="2514600" rtl="0">
         <a:spcBef>
           <a:spcPct val="20000"/>
         </a:spcBef>
         <a:buFont typeface="Arial"/>
         <a:buChar char="•"/>
-        <a:defRPr kern="1200" sz="1500">
+        <a:defRPr kern="1200" sz="2000">
           <a:solidFill>
             <a:schemeClr val="tx1"/>
           </a:solidFill>
@@ -2987,13 +2992,13 @@
           <a:cs typeface="+mn-cs"/>
         </a:defRPr>
       </a:lvl6pPr>
-      <a:lvl7pPr algn="l" defTabSz="342900" eaLnBrk="1" hangingPunct="1" indent="-342900" latinLnBrk="0" marL="2400300" rtl="0">
+      <a:lvl7pPr algn="l" defTabSz="457200" eaLnBrk="1" hangingPunct="1" indent="-228600" latinLnBrk="0" marL="2971800" rtl="0">
         <a:spcBef>
           <a:spcPct val="20000"/>
         </a:spcBef>
         <a:buFont typeface="Arial"/>
         <a:buChar char="•"/>
-        <a:defRPr kern="1200" sz="1500">
+        <a:defRPr kern="1200" sz="2000">
           <a:solidFill>
             <a:schemeClr val="tx1"/>
           </a:solidFill>
@@ -3002,13 +3007,13 @@
           <a:cs typeface="+mn-cs"/>
         </a:defRPr>
       </a:lvl7pPr>
-      <a:lvl8pPr algn="l" defTabSz="342900" eaLnBrk="1" hangingPunct="1" indent="-342900" latinLnBrk="0" marL="2743200" rtl="0">
+      <a:lvl8pPr algn="l" defTabSz="457200" eaLnBrk="1" hangingPunct="1" indent="-228600" latinLnBrk="0" marL="3429000" rtl="0">
         <a:spcBef>
           <a:spcPct val="20000"/>
         </a:spcBef>
         <a:buFont typeface="Arial"/>
         <a:buChar char="•"/>
-        <a:defRPr kern="1200" sz="1500">
+        <a:defRPr kern="1200" sz="2000">
           <a:solidFill>
             <a:schemeClr val="tx1"/>
           </a:solidFill>
@@ -3017,13 +3022,13 @@
           <a:cs typeface="+mn-cs"/>
         </a:defRPr>
       </a:lvl8pPr>
-      <a:lvl9pPr algn="l" defTabSz="342900" eaLnBrk="1" hangingPunct="1" indent="-342900" latinLnBrk="0" marL="3086100" rtl="0">
+      <a:lvl9pPr algn="l" defTabSz="457200" eaLnBrk="1" hangingPunct="1" indent="-228600" latinLnBrk="0" marL="3886200" rtl="0">
         <a:spcBef>
           <a:spcPct val="20000"/>
         </a:spcBef>
         <a:buFont typeface="Arial"/>
         <a:buChar char="•"/>
-        <a:defRPr kern="1200" sz="1500">
+        <a:defRPr kern="1200" sz="2000">
           <a:solidFill>
             <a:schemeClr val="tx1"/>
           </a:solidFill>
@@ -3037,8 +3042,8 @@
       <a:defPPr>
         <a:defRPr lang="en-US"/>
       </a:defPPr>
-      <a:lvl1pPr algn="l" defTabSz="342900" eaLnBrk="1" hangingPunct="1" latinLnBrk="0" marL="0" rtl="0">
-        <a:defRPr kern="1200" sz="1350">
+      <a:lvl1pPr algn="l" defTabSz="457200" eaLnBrk="1" hangingPunct="1" latinLnBrk="0" marL="0" rtl="0">
+        <a:defRPr kern="1200" sz="1800">
           <a:solidFill>
             <a:schemeClr val="tx1"/>
           </a:solidFill>
@@ -3047,8 +3052,8 @@
           <a:cs typeface="+mn-cs"/>
         </a:defRPr>
       </a:lvl1pPr>
-      <a:lvl2pPr algn="l" defTabSz="342900" eaLnBrk="1" hangingPunct="1" latinLnBrk="0" marL="342900" rtl="0">
-        <a:defRPr kern="1200" sz="1350">
+      <a:lvl2pPr algn="l" defTabSz="457200" eaLnBrk="1" hangingPunct="1" latinLnBrk="0" marL="457200" rtl="0">
+        <a:defRPr kern="1200" sz="1800">
           <a:solidFill>
             <a:schemeClr val="tx1"/>
           </a:solidFill>
@@ -3057,8 +3062,8 @@
           <a:cs typeface="+mn-cs"/>
         </a:defRPr>
       </a:lvl2pPr>
-      <a:lvl3pPr algn="l" defTabSz="342900" eaLnBrk="1" hangingPunct="1" latinLnBrk="0" marL="685800" rtl="0">
-        <a:defRPr kern="1200" sz="1350">
+      <a:lvl3pPr algn="l" defTabSz="457200" eaLnBrk="1" hangingPunct="1" latinLnBrk="0" marL="914400" rtl="0">
+        <a:defRPr kern="1200" sz="1800">
           <a:solidFill>
             <a:schemeClr val="tx1"/>
           </a:solidFill>
@@ -3067,8 +3072,8 @@
           <a:cs typeface="+mn-cs"/>
         </a:defRPr>
       </a:lvl3pPr>
-      <a:lvl4pPr algn="l" defTabSz="342900" eaLnBrk="1" hangingPunct="1" latinLnBrk="0" marL="1028700" rtl="0">
-        <a:defRPr kern="1200" sz="1350">
+      <a:lvl4pPr algn="l" defTabSz="457200" eaLnBrk="1" hangingPunct="1" latinLnBrk="0" marL="1371600" rtl="0">
+        <a:defRPr kern="1200" sz="1800">
           <a:solidFill>
             <a:schemeClr val="tx1"/>
           </a:solidFill>
@@ -3077,8 +3082,8 @@
           <a:cs typeface="+mn-cs"/>
         </a:defRPr>
       </a:lvl4pPr>
-      <a:lvl5pPr algn="l" defTabSz="342900" eaLnBrk="1" hangingPunct="1" latinLnBrk="0" marL="1371600" rtl="0">
-        <a:defRPr kern="1200" sz="1350">
+      <a:lvl5pPr algn="l" defTabSz="457200" eaLnBrk="1" hangingPunct="1" latinLnBrk="0" marL="1828800" rtl="0">
+        <a:defRPr kern="1200" sz="1800">
           <a:solidFill>
             <a:schemeClr val="tx1"/>
           </a:solidFill>
@@ -3087,8 +3092,8 @@
           <a:cs typeface="+mn-cs"/>
         </a:defRPr>
       </a:lvl5pPr>
-      <a:lvl6pPr algn="l" defTabSz="342900" eaLnBrk="1" hangingPunct="1" latinLnBrk="0" marL="1714500" rtl="0">
-        <a:defRPr kern="1200" sz="1350">
+      <a:lvl6pPr algn="l" defTabSz="457200" eaLnBrk="1" hangingPunct="1" latinLnBrk="0" marL="2286000" rtl="0">
+        <a:defRPr kern="1200" sz="1800">
           <a:solidFill>
             <a:schemeClr val="tx1"/>
           </a:solidFill>
@@ -3097,8 +3102,8 @@
           <a:cs typeface="+mn-cs"/>
         </a:defRPr>
       </a:lvl6pPr>
-      <a:lvl7pPr algn="l" defTabSz="342900" eaLnBrk="1" hangingPunct="1" latinLnBrk="0" marL="2057400" rtl="0">
-        <a:defRPr kern="1200" sz="1350">
+      <a:lvl7pPr algn="l" defTabSz="457200" eaLnBrk="1" hangingPunct="1" latinLnBrk="0" marL="2743200" rtl="0">
+        <a:defRPr kern="1200" sz="1800">
           <a:solidFill>
             <a:schemeClr val="tx1"/>
           </a:solidFill>
@@ -3107,8 +3112,8 @@
           <a:cs typeface="+mn-cs"/>
         </a:defRPr>
       </a:lvl7pPr>
-      <a:lvl8pPr algn="l" defTabSz="342900" eaLnBrk="1" hangingPunct="1" latinLnBrk="0" marL="2400300" rtl="0">
-        <a:defRPr kern="1200" sz="1350">
+      <a:lvl8pPr algn="l" defTabSz="457200" eaLnBrk="1" hangingPunct="1" latinLnBrk="0" marL="3200400" rtl="0">
+        <a:defRPr kern="1200" sz="1800">
           <a:solidFill>
             <a:schemeClr val="tx1"/>
           </a:solidFill>
@@ -3117,8 +3122,8 @@
           <a:cs typeface="+mn-cs"/>
         </a:defRPr>
       </a:lvl8pPr>
-      <a:lvl9pPr algn="l" defTabSz="342900" eaLnBrk="1" hangingPunct="1" latinLnBrk="0" marL="2743200" rtl="0">
-        <a:defRPr kern="1200" sz="1350">
+      <a:lvl9pPr algn="l" defTabSz="457200" eaLnBrk="1" hangingPunct="1" latinLnBrk="0" marL="3657600" rtl="0">
+        <a:defRPr kern="1200" sz="1800">
           <a:solidFill>
             <a:schemeClr val="tx1"/>
           </a:solidFill>
@@ -3161,8 +3166,8 @@
         </p:nvSpPr>
         <p:spPr>
           <a:xfrm>
-            <a:off x="722313" y="3305176"/>
-            <a:ext cx="7772400" cy="1021556"/>
+            <a:off x="722313" y="4406900"/>
+            <a:ext cx="7772400" cy="1362075"/>
           </a:xfrm>
         </p:spPr>
         <p:txBody>
@@ -3213,8 +3218,8 @@
         </p:nvSpPr>
         <p:spPr>
           <a:xfrm>
-            <a:off x="722313" y="3305176"/>
-            <a:ext cx="7772400" cy="1021556"/>
+            <a:off x="722313" y="4406900"/>
+            <a:ext cx="7772400" cy="1362075"/>
           </a:xfrm>
         </p:spPr>
         <p:txBody>
@@ -3448,8 +3453,8 @@
         </p:nvSpPr>
         <p:spPr>
           <a:xfrm>
-            <a:off x="722313" y="3305176"/>
-            <a:ext cx="7772400" cy="1021556"/>
+            <a:off x="722313" y="4406900"/>
+            <a:ext cx="7772400" cy="1362075"/>
           </a:xfrm>
         </p:spPr>
         <p:txBody>
@@ -3690,8 +3695,8 @@
         </p:nvSpPr>
         <p:spPr>
           <a:xfrm>
-            <a:off x="722313" y="3305176"/>
-            <a:ext cx="7772400" cy="1021556"/>
+            <a:off x="722313" y="4406900"/>
+            <a:ext cx="7772400" cy="1362075"/>
           </a:xfrm>
         </p:spPr>
         <p:txBody>
@@ -3925,8 +3930,8 @@
         </p:nvSpPr>
         <p:spPr>
           <a:xfrm>
-            <a:off x="722313" y="3305176"/>
-            <a:ext cx="7772400" cy="1021556"/>
+            <a:off x="722313" y="4406900"/>
+            <a:ext cx="7772400" cy="1362075"/>
           </a:xfrm>
         </p:spPr>
         <p:txBody>
@@ -4317,8 +4322,8 @@
         </p:nvSpPr>
         <p:spPr>
           <a:xfrm>
-            <a:off x="722313" y="3305176"/>
-            <a:ext cx="7772400" cy="1021556"/>
+            <a:off x="722313" y="4406900"/>
+            <a:ext cx="7772400" cy="1362075"/>
           </a:xfrm>
         </p:spPr>
         <p:txBody>
@@ -4576,8 +4581,8 @@
         </p:nvSpPr>
         <p:spPr>
           <a:xfrm>
-            <a:off x="722313" y="3305176"/>
-            <a:ext cx="7772400" cy="1021556"/>
+            <a:off x="722313" y="4406900"/>
+            <a:ext cx="7772400" cy="1362075"/>
           </a:xfrm>
         </p:spPr>
         <p:txBody>
@@ -4835,8 +4840,8 @@
         </p:nvSpPr>
         <p:spPr>
           <a:xfrm>
-            <a:off x="722313" y="3305176"/>
-            <a:ext cx="7772400" cy="1021556"/>
+            <a:off x="722313" y="4406900"/>
+            <a:ext cx="7772400" cy="1362075"/>
           </a:xfrm>
         </p:spPr>
         <p:txBody>
@@ -5142,8 +5147,8 @@
         </p:nvSpPr>
         <p:spPr>
           <a:xfrm>
-            <a:off x="722313" y="3305176"/>
-            <a:ext cx="7772400" cy="1021556"/>
+            <a:off x="722313" y="4406900"/>
+            <a:ext cx="7772400" cy="1362075"/>
           </a:xfrm>
         </p:spPr>
         <p:txBody>
@@ -5386,8 +5391,8 @@
         </p:nvSpPr>
         <p:spPr>
           <a:xfrm>
-            <a:off x="722313" y="3305176"/>
-            <a:ext cx="7772400" cy="1021556"/>
+            <a:off x="722313" y="4406900"/>
+            <a:ext cx="7772400" cy="1362075"/>
           </a:xfrm>
         </p:spPr>
         <p:txBody>
@@ -5645,8 +5650,8 @@
         </p:nvSpPr>
         <p:spPr>
           <a:xfrm>
-            <a:off x="722313" y="3305176"/>
-            <a:ext cx="7772400" cy="1021556"/>
+            <a:off x="722313" y="4406900"/>
+            <a:ext cx="7772400" cy="1362075"/>
           </a:xfrm>
         </p:spPr>
         <p:txBody>
@@ -5880,8 +5885,8 @@
         </p:nvSpPr>
         <p:spPr>
           <a:xfrm>
-            <a:off x="722313" y="3305176"/>
-            <a:ext cx="7772400" cy="1021556"/>
+            <a:off x="722313" y="4406900"/>
+            <a:ext cx="7772400" cy="1362075"/>
           </a:xfrm>
         </p:spPr>
         <p:txBody>
@@ -5932,8 +5937,8 @@
         </p:nvSpPr>
         <p:spPr>
           <a:xfrm>
-            <a:off x="722313" y="3305176"/>
-            <a:ext cx="7772400" cy="1021556"/>
+            <a:off x="722313" y="4406900"/>
+            <a:ext cx="7772400" cy="1362075"/>
           </a:xfrm>
         </p:spPr>
         <p:txBody>
@@ -6167,8 +6172,8 @@
         </p:nvSpPr>
         <p:spPr>
           <a:xfrm>
-            <a:off x="722313" y="3305176"/>
-            <a:ext cx="7772400" cy="1021556"/>
+            <a:off x="722313" y="4406900"/>
+            <a:ext cx="7772400" cy="1362075"/>
           </a:xfrm>
         </p:spPr>
         <p:txBody>
@@ -6411,8 +6416,8 @@
         </p:nvSpPr>
         <p:spPr>
           <a:xfrm>
-            <a:off x="722313" y="3305176"/>
-            <a:ext cx="7772400" cy="1021556"/>
+            <a:off x="722313" y="4406900"/>
+            <a:ext cx="7772400" cy="1362075"/>
           </a:xfrm>
         </p:spPr>
         <p:txBody>
@@ -6670,8 +6675,8 @@
         </p:nvSpPr>
         <p:spPr>
           <a:xfrm>
-            <a:off x="722313" y="3305176"/>
-            <a:ext cx="7772400" cy="1021556"/>
+            <a:off x="722313" y="4406900"/>
+            <a:ext cx="7772400" cy="1362075"/>
           </a:xfrm>
         </p:spPr>
         <p:txBody>
@@ -7064,8 +7069,8 @@
         </p:nvSpPr>
         <p:spPr>
           <a:xfrm>
-            <a:off x="722313" y="3305176"/>
-            <a:ext cx="7772400" cy="1021556"/>
+            <a:off x="722313" y="4406900"/>
+            <a:ext cx="7772400" cy="1362075"/>
           </a:xfrm>
         </p:spPr>
         <p:txBody>
@@ -7299,8 +7304,8 @@
         </p:nvSpPr>
         <p:spPr>
           <a:xfrm>
-            <a:off x="722313" y="3305176"/>
-            <a:ext cx="7772400" cy="1021556"/>
+            <a:off x="722313" y="4406900"/>
+            <a:ext cx="7772400" cy="1362075"/>
           </a:xfrm>
         </p:spPr>
         <p:txBody>
@@ -7386,6 +7391,27 @@
             </a:r>
           </a:p>
           <a:p>
+            <a:pPr lvl="1"/>
+            <a:r>
+              <a:rPr/>
+              <a:t>소규모 브레이크아웃 룸을 사용해 소그룹 네트워킹을 유도하면 익명성을 깨고 친밀감을 높일 수 있습니다.</a:t>
+            </a:r>
+          </a:p>
+          <a:p>
+            <a:pPr lvl="1"/>
+            <a:r>
+              <a:rPr/>
+              <a:t>시간대가 다른 참가자를 위해 핵심 프로그램은 녹화 및 재시청 링크로 제공하는 것이 좋습니다.</a:t>
+            </a:r>
+          </a:p>
+          <a:p>
+            <a:pPr lvl="1"/>
+            <a:r>
+              <a:rPr/>
+              <a:t>사전에 간단한 아젠다와 기술 가이드(오디오/카메라 체크)를 공유하면 진행 효율이 올라갑니다.</a:t>
+            </a:r>
+          </a:p>
+          <a:p>
             <a:pPr lvl="0"/>
             <a:r>
               <a:rPr/>
@@ -7393,6 +7419,27 @@
             </a:r>
           </a:p>
           <a:p>
+            <a:pPr lvl="1"/>
+            <a:r>
+              <a:rPr/>
+              <a:t>팀을 섞어 진행하면 부서 간 교류와 아이스브레이킹 효과를 동시에 얻을 수 있습니다.</a:t>
+            </a:r>
+          </a:p>
+          <a:p>
+            <a:pPr lvl="1"/>
+            <a:r>
+              <a:rPr/>
+              <a:t>그림 제한시간을 두어 텐션을 유지하고, 우수작을 시상해 작은 보상을 제공하세요.</a:t>
+            </a:r>
+          </a:p>
+          <a:p>
+            <a:pPr lvl="1"/>
+            <a:r>
+              <a:rPr/>
+              <a:t>모바일 친화적인 화이트보드 서비스를 선택하면 접근성이 좋아 참여율이 높아집니다.</a:t>
+            </a:r>
+          </a:p>
+          <a:p>
             <a:pPr lvl="0"/>
             <a:r>
               <a:rPr/>
@@ -7400,6 +7447,27 @@
             </a:r>
           </a:p>
           <a:p>
+            <a:pPr lvl="1"/>
+            <a:r>
+              <a:rPr/>
+              <a:t>사전에 각자 선물 아이디어를 제출받아 이미지를 매핑하면 준비 시간을 줄일 수 있습니다.</a:t>
+            </a:r>
+          </a:p>
+          <a:p>
+            <a:pPr lvl="1"/>
+            <a:r>
+              <a:rPr/>
+              <a:t>랜덤화 규칙과 차등 교환 룰을 명확히 공지해 공정성을 확보하세요.</a:t>
+            </a:r>
+          </a:p>
+          <a:p>
+            <a:pPr lvl="1"/>
+            <a:r>
+              <a:rPr/>
+              <a:t>작은 예산의 기프트카드나 디지털 기프티콘을 사용하면 물류 부담을 없앨 수 있습니다.</a:t>
+            </a:r>
+          </a:p>
+          <a:p>
             <a:pPr lvl="0"/>
             <a:r>
               <a:rPr/>
@@ -7407,10 +7475,52 @@
             </a:r>
           </a:p>
           <a:p>
+            <a:pPr lvl="1"/>
+            <a:r>
+              <a:rPr/>
+              <a:t>이모티콘 난이도를 다양화하면 초보자와 고수 모두 즐길 수 있습니다.</a:t>
+            </a:r>
+          </a:p>
+          <a:p>
+            <a:pPr lvl="1"/>
+            <a:r>
+              <a:rPr/>
+              <a:t>실시간 점수판을 공유하면 경쟁심을 자극해 참여도를 높일 수 있습니다.</a:t>
+            </a:r>
+          </a:p>
+          <a:p>
+            <a:pPr lvl="1"/>
+            <a:r>
+              <a:rPr/>
+              <a:t>채팅 외에 반응 이모지나 리액션을 활용해 빠른 응답을 유도하세요.</a:t>
+            </a:r>
+          </a:p>
+          <a:p>
             <a:pPr lvl="0"/>
             <a:r>
               <a:rPr/>
               <a:t>동일한 제작 키트를 팀원들에게 발송하여 화면 너머로 함께 만들고 공유하는 DIY 장식 세션 운영</a:t>
+            </a:r>
+          </a:p>
+          <a:p>
+            <a:pPr lvl="1"/>
+            <a:r>
+              <a:rPr/>
+              <a:t>키트 구성은 난이도와 소요시간을 명확히 안내해 참여 문턱을 낮추세요.</a:t>
+            </a:r>
+          </a:p>
+          <a:p>
+            <a:pPr lvl="1"/>
+            <a:r>
+              <a:rPr/>
+              <a:t>제작 중간중간 작품을 공유하도록 유도하면 자연스러운 대화가 촉진됩니다.</a:t>
+            </a:r>
+          </a:p>
+          <a:p>
+            <a:pPr lvl="1"/>
+            <a:r>
+              <a:rPr/>
+              <a:t>완성작을 모아 온라인 갤러리로 전시하면 소속감과 성취감을 제공합니다.</a:t>
             </a:r>
           </a:p>
           <a:p>
@@ -7448,6 +7558,39 @@
             <a:r>
               <a:rPr/>
               <a:t> | 슬라이드 쇼 / 채팅 | 캐럴 제목 맞추기 |</a:t>
+            </a:r>
+          </a:p>
+          <a:p>
+            <a:pPr lvl="0"/>
+            <a:r>
+              <a:rPr b="1"/>
+              <a:t>화이트 엘리펀트 설명:</a:t>
+            </a:r>
+            <a:r>
+              <a:rPr/>
+              <a:t> ClickUp 템플릿을 활용해 선물 이미지를 배치하고 번호로 매칭하는 방식입니다. 참여자끼리 랜덤 교환 규칙을 적용하고, 소액 기프티콘을 보상으로 활용하면 실행이 쉽습니다.</a:t>
+            </a:r>
+          </a:p>
+          <a:p>
+            <a:pPr lvl="0"/>
+            <a:r>
+              <a:rPr b="1"/>
+              <a:t>크리스마스 사전 설명:</a:t>
+            </a:r>
+            <a:r>
+              <a:rPr/>
+              <a:t> 온라인 화이트보드에 팀이 순서대로 그림을 그리고 다른 팀은 제목을 추측합니다. 시간 제한과 채점 기준을 두어 공정성을 유지하고, 우수팀을 시상하면 몰입도가 증가합니다.</a:t>
+            </a:r>
+          </a:p>
+          <a:p>
+            <a:pPr lvl="0"/>
+            <a:r>
+              <a:rPr b="1"/>
+              <a:t>이모티콘 퀴즈 설명:</a:t>
+            </a:r>
+            <a:r>
+              <a:rPr/>
+              <a:t> 슬라이드 쇼에 이모티콘으로 구성된 문제를 올리고 채팅으로 정답을 받습니다. 난이도별로 점수를 부여하고 순위별 소정의 상품을 제공하면 경쟁과 재미를 동시에 유도할 수 있습니다.</a:t>
             </a:r>
           </a:p>
         </p:txBody>
@@ -7558,8 +7701,8 @@
         </p:nvSpPr>
         <p:spPr>
           <a:xfrm>
-            <a:off x="722313" y="3305176"/>
-            <a:ext cx="7772400" cy="1021556"/>
+            <a:off x="722313" y="4406900"/>
+            <a:ext cx="7772400" cy="1362075"/>
           </a:xfrm>
         </p:spPr>
         <p:txBody>
@@ -7872,8 +8015,8 @@
         </p:nvSpPr>
         <p:spPr>
           <a:xfrm>
-            <a:off x="722313" y="3305176"/>
-            <a:ext cx="7772400" cy="1021556"/>
+            <a:off x="722313" y="4406900"/>
+            <a:ext cx="7772400" cy="1362075"/>
           </a:xfrm>
         </p:spPr>
         <p:txBody>

</xml_diff>